<commit_message>
Finalized presentation, made user guide
</commit_message>
<xml_diff>
--- a/documentation/exhibit_promo.pptx
+++ b/documentation/exhibit_promo.pptx
@@ -568,7 +568,7 @@
           <a:p>
             <a:fld id="{F7AFFB9B-9FB8-469E-96F9-4D32314110B6}" type="datetimeFigureOut">
               <a:rPr lang="en-US" dirty="0"/>
-              <a:t>12/1/2018</a:t>
+              <a:t>12/2/2018</a:t>
             </a:fld>
             <a:endParaRPr lang="en-US" dirty="0"/>
           </a:p>
@@ -904,7 +904,7 @@
           <a:p>
             <a:fld id="{341D2AC3-6A0B-4169-B1EA-E3AE8B351BDD}" type="datetimeFigureOut">
               <a:rPr lang="en-US" dirty="0"/>
-              <a:t>12/1/2018</a:t>
+              <a:t>12/2/2018</a:t>
             </a:fld>
             <a:endParaRPr lang="en-US" dirty="0"/>
           </a:p>
@@ -1103,7 +1103,7 @@
           <a:p>
             <a:fld id="{DD4B9363-8B87-41B7-9F8E-64519CBB8F34}" type="datetimeFigureOut">
               <a:rPr lang="en-US" dirty="0"/>
-              <a:t>12/1/2018</a:t>
+              <a:t>12/2/2018</a:t>
             </a:fld>
             <a:endParaRPr lang="en-US" dirty="0"/>
           </a:p>
@@ -1376,7 +1376,7 @@
           <a:p>
             <a:fld id="{EAEF5746-5284-4951-9F37-7AE924EDBCB7}" type="datetimeFigureOut">
               <a:rPr lang="en-US" dirty="0"/>
-              <a:t>12/1/2018</a:t>
+              <a:t>12/2/2018</a:t>
             </a:fld>
             <a:endParaRPr lang="en-US" dirty="0"/>
           </a:p>
@@ -1807,7 +1807,7 @@
           <a:p>
             <a:fld id="{02398B29-7265-4A65-A2A4-6703C057B7C1}" type="datetimeFigureOut">
               <a:rPr lang="en-US" dirty="0"/>
-              <a:t>12/1/2018</a:t>
+              <a:t>12/2/2018</a:t>
             </a:fld>
             <a:endParaRPr lang="en-US" dirty="0"/>
           </a:p>
@@ -2360,7 +2360,7 @@
           <a:p>
             <a:fld id="{28FBA082-94DF-4C4B-A041-6624924AB0A8}" type="datetimeFigureOut">
               <a:rPr lang="en-US" dirty="0"/>
-              <a:t>12/1/2018</a:t>
+              <a:t>12/2/2018</a:t>
             </a:fld>
             <a:endParaRPr lang="en-US" dirty="0"/>
           </a:p>
@@ -3153,7 +3153,7 @@
           <a:p>
             <a:fld id="{B27686C4-3AB5-4E0C-86CA-FB108C350AA9}" type="datetimeFigureOut">
               <a:rPr lang="en-US" dirty="0"/>
-              <a:t>12/1/2018</a:t>
+              <a:t>12/2/2018</a:t>
             </a:fld>
             <a:endParaRPr lang="en-US" dirty="0"/>
           </a:p>
@@ -3335,7 +3335,7 @@
           <a:p>
             <a:fld id="{49FF1211-4E0C-4AB3-B04F-585959BDAFE8}" type="datetimeFigureOut">
               <a:rPr lang="en-US" dirty="0"/>
-              <a:t>12/1/2018</a:t>
+              <a:t>12/2/2018</a:t>
             </a:fld>
             <a:endParaRPr lang="en-US" dirty="0"/>
           </a:p>
@@ -3522,7 +3522,7 @@
           <a:p>
             <a:fld id="{28BDECAF-D3BE-4069-9C78-642ECCD01477}" type="datetimeFigureOut">
               <a:rPr lang="en-US" dirty="0"/>
-              <a:t>12/1/2018</a:t>
+              <a:t>12/2/2018</a:t>
             </a:fld>
             <a:endParaRPr lang="en-US" dirty="0"/>
           </a:p>
@@ -3700,7 +3700,7 @@
           <a:p>
             <a:fld id="{8EFBDC27-E420-4878-9EE6-7B9656D6442A}" type="datetimeFigureOut">
               <a:rPr lang="en-US" dirty="0"/>
-              <a:t>12/1/2018</a:t>
+              <a:t>12/2/2018</a:t>
             </a:fld>
             <a:endParaRPr lang="en-US" dirty="0"/>
           </a:p>
@@ -3953,7 +3953,7 @@
           <a:p>
             <a:fld id="{0F7F47CF-67C9-420C-80A5-E2069FF0C2DF}" type="datetimeFigureOut">
               <a:rPr lang="en-US" dirty="0"/>
-              <a:t>12/1/2018</a:t>
+              <a:t>12/2/2018</a:t>
             </a:fld>
             <a:endParaRPr lang="en-US" dirty="0"/>
           </a:p>
@@ -4193,7 +4193,7 @@
           <a:p>
             <a:fld id="{AE22DC73-F065-42F5-A9F2-D90B2E42A0B3}" type="datetimeFigureOut">
               <a:rPr lang="en-US" dirty="0"/>
-              <a:t>12/1/2018</a:t>
+              <a:t>12/2/2018</a:t>
             </a:fld>
             <a:endParaRPr lang="en-US" dirty="0"/>
           </a:p>
@@ -4581,7 +4581,7 @@
           <a:p>
             <a:fld id="{76BEA702-9B29-41CC-9BCC-3DF8A0D379FE}" type="datetimeFigureOut">
               <a:rPr lang="en-US" dirty="0"/>
-              <a:t>12/1/2018</a:t>
+              <a:t>12/2/2018</a:t>
             </a:fld>
             <a:endParaRPr lang="en-US" dirty="0"/>
           </a:p>
@@ -4702,7 +4702,7 @@
           <a:p>
             <a:fld id="{097649AC-CB8F-4FF1-9A34-5861C74DD0A7}" type="datetimeFigureOut">
               <a:rPr lang="en-US" dirty="0"/>
-              <a:t>12/1/2018</a:t>
+              <a:t>12/2/2018</a:t>
             </a:fld>
             <a:endParaRPr lang="en-US" dirty="0"/>
           </a:p>
@@ -4800,7 +4800,7 @@
           <a:p>
             <a:fld id="{3EC5CECA-2D3A-4680-9B49-752200DE467C}" type="datetimeFigureOut">
               <a:rPr lang="en-US" dirty="0"/>
-              <a:t>12/1/2018</a:t>
+              <a:t>12/2/2018</a:t>
             </a:fld>
             <a:endParaRPr lang="en-US" dirty="0"/>
           </a:p>
@@ -5056,7 +5056,7 @@
           <a:p>
             <a:fld id="{50C3BFE2-83B7-4B0A-B9D3-AB28331082B3}" type="datetimeFigureOut">
               <a:rPr lang="en-US" dirty="0"/>
-              <a:t>12/1/2018</a:t>
+              <a:t>12/2/2018</a:t>
             </a:fld>
             <a:endParaRPr lang="en-US" dirty="0"/>
           </a:p>
@@ -5328,7 +5328,7 @@
           <a:p>
             <a:fld id="{12EF78E3-FDA3-4D28-AAA2-0B81F349A39D}" type="datetimeFigureOut">
               <a:rPr lang="en-US" dirty="0"/>
-              <a:t>12/1/2018</a:t>
+              <a:t>12/2/2018</a:t>
             </a:fld>
             <a:endParaRPr lang="en-US" dirty="0"/>
           </a:p>
@@ -5734,7 +5734,7 @@
           <a:p>
             <a:fld id="{C35BB1C6-BF8F-4481-8AB2-603A1C8A906A}" type="datetimeFigureOut">
               <a:rPr lang="en-US" dirty="0"/>
-              <a:t>12/1/2018</a:t>
+              <a:t>12/2/2018</a:t>
             </a:fld>
             <a:endParaRPr lang="en-US" dirty="0"/>
           </a:p>
@@ -6942,7 +6942,7 @@
         </p:nvSpPr>
         <p:spPr>
           <a:xfrm>
-            <a:off x="87187" y="1588323"/>
+            <a:off x="619458" y="1588323"/>
             <a:ext cx="6929620" cy="3937379"/>
           </a:xfrm>
         </p:spPr>
@@ -6954,7 +6954,7 @@
           <a:p>
             <a:pPr>
               <a:spcBef>
-                <a:spcPts val="5400"/>
+                <a:spcPts val="2000"/>
               </a:spcBef>
             </a:pPr>
             <a:r>
@@ -6967,13 +6967,70 @@
             </a:r>
             <a:r>
               <a:rPr lang="en-US" dirty="0"/>
-              <a:t> To use arrow keys for positioning a mirror</a:t>
+              <a:t> and…</a:t>
+            </a:r>
+          </a:p>
+          <a:p>
+            <a:pPr lvl="1">
+              <a:spcBef>
+                <a:spcPts val="2000"/>
+              </a:spcBef>
+            </a:pPr>
+            <a:r>
+              <a:rPr lang="en-US" dirty="0"/>
+              <a:t>use </a:t>
+            </a:r>
+            <a:r>
+              <a:rPr lang="en-US" u="sng" dirty="0"/>
+              <a:t>arrow keys</a:t>
+            </a:r>
+            <a:r>
+              <a:rPr lang="en-US" dirty="0"/>
+              <a:t> for positioning a mirror</a:t>
+            </a:r>
+          </a:p>
+          <a:p>
+            <a:pPr lvl="1">
+              <a:spcBef>
+                <a:spcPts val="2000"/>
+              </a:spcBef>
+            </a:pPr>
+            <a:r>
+              <a:rPr lang="en-US" dirty="0"/>
+              <a:t>Press </a:t>
+            </a:r>
+            <a:r>
+              <a:rPr lang="en-US" u="sng" dirty="0"/>
+              <a:t>R</a:t>
+            </a:r>
+            <a:r>
+              <a:rPr lang="en-US" dirty="0"/>
+              <a:t> to rotate the mirror</a:t>
+            </a:r>
+          </a:p>
+          <a:p>
+            <a:pPr lvl="1">
+              <a:spcBef>
+                <a:spcPts val="2000"/>
+              </a:spcBef>
+            </a:pPr>
+            <a:r>
+              <a:rPr lang="en-US" dirty="0"/>
+              <a:t>Press </a:t>
+            </a:r>
+            <a:r>
+              <a:rPr lang="en-US" u="sng" dirty="0"/>
+              <a:t>Spacebar</a:t>
+            </a:r>
+            <a:r>
+              <a:rPr lang="en-US" dirty="0"/>
+              <a:t> to Place the Mirror – You Can’t Delete Them!</a:t>
             </a:r>
           </a:p>
           <a:p>
             <a:pPr>
               <a:spcBef>
-                <a:spcPts val="5400"/>
+                <a:spcPts val="2000"/>
               </a:spcBef>
             </a:pPr>
             <a:r>
@@ -6982,36 +7039,17 @@
             </a:r>
             <a:r>
               <a:rPr lang="en-US" u="sng" dirty="0"/>
-              <a:t>Spacebar</a:t>
+              <a:t>S</a:t>
             </a:r>
             <a:r>
               <a:rPr lang="en-US" dirty="0"/>
-              <a:t> to Place a Mirror – You Can’t Delete Them!</a:t>
+              <a:t> to use arrow keys for your laser gun angle</a:t>
             </a:r>
           </a:p>
           <a:p>
             <a:pPr>
               <a:spcBef>
-                <a:spcPts val="5400"/>
-              </a:spcBef>
-            </a:pPr>
-            <a:r>
-              <a:rPr lang="en-US" dirty="0"/>
-              <a:t>Press </a:t>
-            </a:r>
-            <a:r>
-              <a:rPr lang="en-US" u="sng" dirty="0"/>
-              <a:t>S</a:t>
-            </a:r>
-            <a:r>
-              <a:rPr lang="en-US" dirty="0"/>
-              <a:t> to use arrow keys for your laser gun angle</a:t>
-            </a:r>
-          </a:p>
-          <a:p>
-            <a:pPr>
-              <a:spcBef>
-                <a:spcPts val="5400"/>
+                <a:spcPts val="2000"/>
               </a:spcBef>
             </a:pPr>
             <a:r>
@@ -7064,10 +7102,10 @@
       </p:sp>
       <p:grpSp>
         <p:nvGrpSpPr>
-          <p:cNvPr id="14" name="Group 13">
+          <p:cNvPr id="9" name="Group 8">
             <a:extLst>
               <a:ext uri="{FF2B5EF4-FFF2-40B4-BE49-F238E27FC236}">
-                <a16:creationId xmlns:a16="http://schemas.microsoft.com/office/drawing/2014/main" id="{6F413D19-35EF-4F71-9E6A-B6C2DBE2FDAC}"/>
+                <a16:creationId xmlns:a16="http://schemas.microsoft.com/office/drawing/2014/main" id="{16DBC32F-2314-450B-A1EC-44D24FF156F9}"/>
               </a:ext>
             </a:extLst>
           </p:cNvPr>
@@ -7076,540 +7114,519 @@
         </p:nvGrpSpPr>
         <p:grpSpPr>
           <a:xfrm>
-            <a:off x="6070240" y="1464127"/>
-            <a:ext cx="1761129" cy="688082"/>
-            <a:chOff x="6018492" y="2238326"/>
-            <a:chExt cx="1761129" cy="688082"/>
+            <a:off x="5707360" y="2159787"/>
+            <a:ext cx="1526274" cy="668875"/>
+            <a:chOff x="3416490" y="2183642"/>
+            <a:chExt cx="1526274" cy="668875"/>
           </a:xfrm>
         </p:grpSpPr>
-        <p:grpSp>
-          <p:nvGrpSpPr>
-            <p:cNvPr id="9" name="Group 8">
+        <p:sp>
+          <p:nvSpPr>
+            <p:cNvPr id="4" name="Rectangle: Rounded Corners 3">
               <a:extLst>
                 <a:ext uri="{FF2B5EF4-FFF2-40B4-BE49-F238E27FC236}">
-                  <a16:creationId xmlns:a16="http://schemas.microsoft.com/office/drawing/2014/main" id="{16DBC32F-2314-450B-A1EC-44D24FF156F9}"/>
+                  <a16:creationId xmlns:a16="http://schemas.microsoft.com/office/drawing/2014/main" id="{C613A822-E5B1-4FEB-8F55-BCFB6482A96B}"/>
                 </a:ext>
               </a:extLst>
             </p:cNvPr>
-            <p:cNvGrpSpPr/>
+            <p:cNvSpPr/>
             <p:nvPr/>
-          </p:nvGrpSpPr>
-          <p:grpSpPr>
+          </p:nvSpPr>
+          <p:spPr>
             <a:xfrm>
-              <a:off x="6253347" y="2257533"/>
-              <a:ext cx="1526274" cy="668875"/>
-              <a:chOff x="3416490" y="2183642"/>
-              <a:chExt cx="1526274" cy="668875"/>
+              <a:off x="3957851" y="2183642"/>
+              <a:ext cx="443552" cy="300251"/>
             </a:xfrm>
-          </p:grpSpPr>
-          <p:sp>
-            <p:nvSpPr>
-              <p:cNvPr id="4" name="Rectangle: Rounded Corners 3">
-                <a:extLst>
-                  <a:ext uri="{FF2B5EF4-FFF2-40B4-BE49-F238E27FC236}">
-                    <a16:creationId xmlns:a16="http://schemas.microsoft.com/office/drawing/2014/main" id="{C613A822-E5B1-4FEB-8F55-BCFB6482A96B}"/>
-                  </a:ext>
-                </a:extLst>
-              </p:cNvPr>
-              <p:cNvSpPr/>
-              <p:nvPr/>
-            </p:nvSpPr>
-            <p:spPr>
-              <a:xfrm>
-                <a:off x="3957851" y="2183642"/>
-                <a:ext cx="443552" cy="300251"/>
-              </a:xfrm>
-              <a:prstGeom prst="roundRect">
-                <a:avLst/>
-              </a:prstGeom>
-              <a:ln>
-                <a:solidFill>
-                  <a:srgbClr val="860708"/>
-                </a:solidFill>
-              </a:ln>
-            </p:spPr>
-            <p:style>
-              <a:lnRef idx="2">
-                <a:schemeClr val="accent1">
-                  <a:shade val="50000"/>
-                </a:schemeClr>
-              </a:lnRef>
-              <a:fillRef idx="1">
-                <a:schemeClr val="accent1"/>
-              </a:fillRef>
-              <a:effectRef idx="0">
-                <a:schemeClr val="accent1"/>
-              </a:effectRef>
-              <a:fontRef idx="minor">
-                <a:schemeClr val="lt1"/>
-              </a:fontRef>
-            </p:style>
-            <p:txBody>
-              <a:bodyPr rtlCol="0" anchor="ctr"/>
-              <a:lstStyle/>
-              <a:p>
-                <a:pPr algn="ctr"/>
-                <a:endParaRPr lang="en-US"/>
-              </a:p>
-            </p:txBody>
-          </p:sp>
-          <p:sp>
-            <p:nvSpPr>
-              <p:cNvPr id="5" name="Rectangle: Rounded Corners 4">
-                <a:extLst>
-                  <a:ext uri="{FF2B5EF4-FFF2-40B4-BE49-F238E27FC236}">
-                    <a16:creationId xmlns:a16="http://schemas.microsoft.com/office/drawing/2014/main" id="{A73FCCFD-E885-4413-B026-4C924EAA9085}"/>
-                  </a:ext>
-                </a:extLst>
-              </p:cNvPr>
-              <p:cNvSpPr/>
-              <p:nvPr/>
-            </p:nvSpPr>
-            <p:spPr>
-              <a:xfrm>
-                <a:off x="3957851" y="2552266"/>
-                <a:ext cx="443552" cy="300251"/>
-              </a:xfrm>
-              <a:prstGeom prst="roundRect">
-                <a:avLst/>
-              </a:prstGeom>
-            </p:spPr>
-            <p:style>
-              <a:lnRef idx="2">
-                <a:schemeClr val="accent1">
-                  <a:shade val="50000"/>
-                </a:schemeClr>
-              </a:lnRef>
-              <a:fillRef idx="1">
-                <a:schemeClr val="accent1"/>
-              </a:fillRef>
-              <a:effectRef idx="0">
-                <a:schemeClr val="accent1"/>
-              </a:effectRef>
-              <a:fontRef idx="minor">
-                <a:schemeClr val="lt1"/>
-              </a:fontRef>
-            </p:style>
-            <p:txBody>
-              <a:bodyPr rtlCol="0" anchor="ctr"/>
-              <a:lstStyle/>
-              <a:p>
-                <a:pPr algn="ctr"/>
-                <a:endParaRPr lang="en-US" dirty="0"/>
-              </a:p>
-            </p:txBody>
-          </p:sp>
-          <p:sp>
-            <p:nvSpPr>
-              <p:cNvPr id="7" name="Rectangle: Rounded Corners 6">
-                <a:extLst>
-                  <a:ext uri="{FF2B5EF4-FFF2-40B4-BE49-F238E27FC236}">
-                    <a16:creationId xmlns:a16="http://schemas.microsoft.com/office/drawing/2014/main" id="{73818C5D-C0E0-4AAA-BA82-12EF22EE8849}"/>
-                  </a:ext>
-                </a:extLst>
-              </p:cNvPr>
-              <p:cNvSpPr/>
-              <p:nvPr/>
-            </p:nvSpPr>
-            <p:spPr>
-              <a:xfrm>
-                <a:off x="3416490" y="2552266"/>
-                <a:ext cx="443552" cy="300251"/>
-              </a:xfrm>
-              <a:prstGeom prst="roundRect">
-                <a:avLst/>
-              </a:prstGeom>
+            <a:prstGeom prst="roundRect">
+              <a:avLst/>
+            </a:prstGeom>
+            <a:ln>
               <a:solidFill>
-                <a:schemeClr val="accent1"/>
+                <a:srgbClr val="860708"/>
               </a:solidFill>
-              <a:ln>
-                <a:solidFill>
-                  <a:srgbClr val="860708"/>
-                </a:solidFill>
-                <a:headEnd type="none" w="med" len="med"/>
-                <a:tailEnd type="none" w="med" len="med"/>
-              </a:ln>
-            </p:spPr>
-            <p:style>
-              <a:lnRef idx="2">
-                <a:schemeClr val="accent1"/>
-              </a:lnRef>
-              <a:fillRef idx="1">
-                <a:schemeClr val="lt1"/>
-              </a:fillRef>
-              <a:effectRef idx="0">
-                <a:schemeClr val="accent1"/>
-              </a:effectRef>
-              <a:fontRef idx="minor">
-                <a:schemeClr val="dk1"/>
-              </a:fontRef>
-            </p:style>
-            <p:txBody>
-              <a:bodyPr rtlCol="0" anchor="ctr"/>
-              <a:lstStyle/>
-              <a:p>
-                <a:pPr algn="ctr"/>
-                <a:endParaRPr lang="en-US"/>
-              </a:p>
-            </p:txBody>
-          </p:sp>
-          <p:sp>
-            <p:nvSpPr>
-              <p:cNvPr id="8" name="Rectangle: Rounded Corners 7">
-                <a:extLst>
-                  <a:ext uri="{FF2B5EF4-FFF2-40B4-BE49-F238E27FC236}">
-                    <a16:creationId xmlns:a16="http://schemas.microsoft.com/office/drawing/2014/main" id="{F50B6574-786B-4AFE-B67D-D3EBB6A6A9DF}"/>
-                  </a:ext>
-                </a:extLst>
-              </p:cNvPr>
-              <p:cNvSpPr/>
-              <p:nvPr/>
-            </p:nvSpPr>
-            <p:spPr>
-              <a:xfrm>
-                <a:off x="4499212" y="2552265"/>
-                <a:ext cx="443552" cy="300251"/>
-              </a:xfrm>
-              <a:prstGeom prst="roundRect">
-                <a:avLst/>
-              </a:prstGeom>
-              <a:solidFill>
-                <a:schemeClr val="accent1"/>
-              </a:solidFill>
-              <a:ln>
-                <a:solidFill>
-                  <a:srgbClr val="860708"/>
-                </a:solidFill>
-                <a:headEnd type="none" w="med" len="med"/>
-                <a:tailEnd type="none" w="med" len="med"/>
-              </a:ln>
-            </p:spPr>
-            <p:style>
-              <a:lnRef idx="2">
-                <a:schemeClr val="accent1"/>
-              </a:lnRef>
-              <a:fillRef idx="1">
-                <a:schemeClr val="lt1"/>
-              </a:fillRef>
-              <a:effectRef idx="0">
-                <a:schemeClr val="accent1"/>
-              </a:effectRef>
-              <a:fontRef idx="minor">
-                <a:schemeClr val="dk1"/>
-              </a:fontRef>
-            </p:style>
-            <p:txBody>
-              <a:bodyPr rtlCol="0" anchor="ctr"/>
-              <a:lstStyle/>
-              <a:p>
-                <a:pPr algn="ctr"/>
-                <a:endParaRPr lang="en-US"/>
-              </a:p>
-            </p:txBody>
-          </p:sp>
-          <p:cxnSp>
-            <p:nvCxnSpPr>
-              <p:cNvPr id="12" name="Straight Arrow Connector 11">
-                <a:extLst>
-                  <a:ext uri="{FF2B5EF4-FFF2-40B4-BE49-F238E27FC236}">
-                    <a16:creationId xmlns:a16="http://schemas.microsoft.com/office/drawing/2014/main" id="{8892E26C-61DD-4B46-97A4-7E58337EBAA8}"/>
-                  </a:ext>
-                </a:extLst>
-              </p:cNvPr>
-              <p:cNvCxnSpPr>
-                <a:cxnSpLocks/>
-              </p:cNvCxnSpPr>
-              <p:nvPr/>
-            </p:nvCxnSpPr>
-            <p:spPr>
-              <a:xfrm flipV="1">
-                <a:off x="4179627" y="2251879"/>
-                <a:ext cx="0" cy="150126"/>
-              </a:xfrm>
-              <a:prstGeom prst="straightConnector1">
-                <a:avLst/>
-              </a:prstGeom>
-              <a:ln>
-                <a:solidFill>
-                  <a:schemeClr val="bg1"/>
-                </a:solidFill>
-                <a:tailEnd type="triangle"/>
-              </a:ln>
-            </p:spPr>
-            <p:style>
-              <a:lnRef idx="1">
-                <a:schemeClr val="accent1"/>
-              </a:lnRef>
-              <a:fillRef idx="0">
-                <a:schemeClr val="accent1"/>
-              </a:fillRef>
-              <a:effectRef idx="0">
-                <a:schemeClr val="accent1"/>
-              </a:effectRef>
-              <a:fontRef idx="minor">
-                <a:schemeClr val="tx1"/>
-              </a:fontRef>
-            </p:style>
-          </p:cxnSp>
-          <p:cxnSp>
-            <p:nvCxnSpPr>
-              <p:cNvPr id="13" name="Straight Arrow Connector 12">
-                <a:extLst>
-                  <a:ext uri="{FF2B5EF4-FFF2-40B4-BE49-F238E27FC236}">
-                    <a16:creationId xmlns:a16="http://schemas.microsoft.com/office/drawing/2014/main" id="{2449AFD0-F555-4B5A-B910-8E24EA83E77B}"/>
-                  </a:ext>
-                </a:extLst>
-              </p:cNvPr>
-              <p:cNvCxnSpPr>
-                <a:cxnSpLocks/>
-              </p:cNvCxnSpPr>
-              <p:nvPr/>
-            </p:nvCxnSpPr>
-            <p:spPr>
-              <a:xfrm>
-                <a:off x="4179627" y="2631133"/>
-                <a:ext cx="0" cy="163954"/>
-              </a:xfrm>
-              <a:prstGeom prst="straightConnector1">
-                <a:avLst/>
-              </a:prstGeom>
-              <a:ln>
-                <a:solidFill>
-                  <a:schemeClr val="bg1"/>
-                </a:solidFill>
-                <a:tailEnd type="triangle"/>
-              </a:ln>
-            </p:spPr>
-            <p:style>
-              <a:lnRef idx="1">
-                <a:schemeClr val="accent1"/>
-              </a:lnRef>
-              <a:fillRef idx="0">
-                <a:schemeClr val="accent1"/>
-              </a:fillRef>
-              <a:effectRef idx="0">
-                <a:schemeClr val="accent1"/>
-              </a:effectRef>
-              <a:fontRef idx="minor">
-                <a:schemeClr val="tx1"/>
-              </a:fontRef>
-            </p:style>
-          </p:cxnSp>
-          <p:cxnSp>
-            <p:nvCxnSpPr>
-              <p:cNvPr id="20" name="Straight Arrow Connector 19">
-                <a:extLst>
-                  <a:ext uri="{FF2B5EF4-FFF2-40B4-BE49-F238E27FC236}">
-                    <a16:creationId xmlns:a16="http://schemas.microsoft.com/office/drawing/2014/main" id="{EFDE3BE9-6F78-408F-AAB1-3ABF9B9E9F5B}"/>
-                  </a:ext>
-                </a:extLst>
-              </p:cNvPr>
-              <p:cNvCxnSpPr>
-                <a:cxnSpLocks/>
-              </p:cNvCxnSpPr>
-              <p:nvPr/>
-            </p:nvCxnSpPr>
-            <p:spPr>
-              <a:xfrm>
-                <a:off x="4635707" y="2702390"/>
-                <a:ext cx="174659" cy="0"/>
-              </a:xfrm>
-              <a:prstGeom prst="straightConnector1">
-                <a:avLst/>
-              </a:prstGeom>
-              <a:ln>
-                <a:solidFill>
-                  <a:schemeClr val="bg1"/>
-                </a:solidFill>
-                <a:tailEnd type="triangle"/>
-              </a:ln>
-            </p:spPr>
-            <p:style>
-              <a:lnRef idx="1">
-                <a:schemeClr val="accent1"/>
-              </a:lnRef>
-              <a:fillRef idx="0">
-                <a:schemeClr val="accent1"/>
-              </a:fillRef>
-              <a:effectRef idx="0">
-                <a:schemeClr val="accent1"/>
-              </a:effectRef>
-              <a:fontRef idx="minor">
-                <a:schemeClr val="tx1"/>
-              </a:fontRef>
-            </p:style>
-          </p:cxnSp>
-          <p:cxnSp>
-            <p:nvCxnSpPr>
-              <p:cNvPr id="22" name="Straight Arrow Connector 21">
-                <a:extLst>
-                  <a:ext uri="{FF2B5EF4-FFF2-40B4-BE49-F238E27FC236}">
-                    <a16:creationId xmlns:a16="http://schemas.microsoft.com/office/drawing/2014/main" id="{12C35B26-0A3A-42A7-9342-BD526946D49E}"/>
-                  </a:ext>
-                </a:extLst>
-              </p:cNvPr>
-              <p:cNvCxnSpPr>
-                <a:cxnSpLocks/>
-              </p:cNvCxnSpPr>
-              <p:nvPr/>
-            </p:nvCxnSpPr>
-            <p:spPr>
-              <a:xfrm flipH="1">
-                <a:off x="3551997" y="2702390"/>
-                <a:ext cx="172538" cy="0"/>
-              </a:xfrm>
-              <a:prstGeom prst="straightConnector1">
-                <a:avLst/>
-              </a:prstGeom>
-              <a:ln>
-                <a:solidFill>
-                  <a:schemeClr val="bg1"/>
-                </a:solidFill>
-                <a:tailEnd type="triangle"/>
-              </a:ln>
-            </p:spPr>
-            <p:style>
-              <a:lnRef idx="1">
-                <a:schemeClr val="accent1"/>
-              </a:lnRef>
-              <a:fillRef idx="0">
-                <a:schemeClr val="accent1"/>
-              </a:fillRef>
-              <a:effectRef idx="0">
-                <a:schemeClr val="accent1"/>
-              </a:effectRef>
-              <a:fontRef idx="minor">
-                <a:schemeClr val="tx1"/>
-              </a:fontRef>
-            </p:style>
-          </p:cxnSp>
-        </p:grpSp>
-        <p:grpSp>
-          <p:nvGrpSpPr>
-            <p:cNvPr id="11" name="Group 10">
+            </a:ln>
+          </p:spPr>
+          <p:style>
+            <a:lnRef idx="2">
+              <a:schemeClr val="accent1">
+                <a:shade val="50000"/>
+              </a:schemeClr>
+            </a:lnRef>
+            <a:fillRef idx="1">
+              <a:schemeClr val="accent1"/>
+            </a:fillRef>
+            <a:effectRef idx="0">
+              <a:schemeClr val="accent1"/>
+            </a:effectRef>
+            <a:fontRef idx="minor">
+              <a:schemeClr val="lt1"/>
+            </a:fontRef>
+          </p:style>
+          <p:txBody>
+            <a:bodyPr rtlCol="0" anchor="ctr"/>
+            <a:lstStyle/>
+            <a:p>
+              <a:pPr algn="ctr"/>
+              <a:endParaRPr lang="en-US"/>
+            </a:p>
+          </p:txBody>
+        </p:sp>
+        <p:sp>
+          <p:nvSpPr>
+            <p:cNvPr id="5" name="Rectangle: Rounded Corners 4">
               <a:extLst>
                 <a:ext uri="{FF2B5EF4-FFF2-40B4-BE49-F238E27FC236}">
-                  <a16:creationId xmlns:a16="http://schemas.microsoft.com/office/drawing/2014/main" id="{2F8DCF8E-BBBC-482D-9A09-E7769FF93168}"/>
+                  <a16:creationId xmlns:a16="http://schemas.microsoft.com/office/drawing/2014/main" id="{A73FCCFD-E885-4413-B026-4C924EAA9085}"/>
                 </a:ext>
               </a:extLst>
             </p:cNvPr>
-            <p:cNvGrpSpPr/>
+            <p:cNvSpPr/>
             <p:nvPr/>
-          </p:nvGrpSpPr>
-          <p:grpSpPr>
+          </p:nvSpPr>
+          <p:spPr>
             <a:xfrm>
-              <a:off x="6018492" y="2238326"/>
-              <a:ext cx="443552" cy="312769"/>
-              <a:chOff x="1312460" y="4287672"/>
-              <a:chExt cx="443552" cy="312769"/>
+              <a:off x="3957851" y="2552266"/>
+              <a:ext cx="443552" cy="300251"/>
             </a:xfrm>
-          </p:grpSpPr>
-          <p:sp>
-            <p:nvSpPr>
-              <p:cNvPr id="10" name="Rectangle: Rounded Corners 9">
-                <a:extLst>
-                  <a:ext uri="{FF2B5EF4-FFF2-40B4-BE49-F238E27FC236}">
-                    <a16:creationId xmlns:a16="http://schemas.microsoft.com/office/drawing/2014/main" id="{2E090F7B-0E13-450D-810B-56B8D59F8D4D}"/>
-                  </a:ext>
-                </a:extLst>
-              </p:cNvPr>
-              <p:cNvSpPr/>
-              <p:nvPr/>
-            </p:nvSpPr>
-            <p:spPr>
-              <a:xfrm>
-                <a:off x="1312460" y="4287672"/>
-                <a:ext cx="443552" cy="300251"/>
-              </a:xfrm>
-              <a:prstGeom prst="roundRect">
-                <a:avLst/>
-              </a:prstGeom>
+            <a:prstGeom prst="roundRect">
+              <a:avLst/>
+            </a:prstGeom>
+          </p:spPr>
+          <p:style>
+            <a:lnRef idx="2">
+              <a:schemeClr val="accent1">
+                <a:shade val="50000"/>
+              </a:schemeClr>
+            </a:lnRef>
+            <a:fillRef idx="1">
+              <a:schemeClr val="accent1"/>
+            </a:fillRef>
+            <a:effectRef idx="0">
+              <a:schemeClr val="accent1"/>
+            </a:effectRef>
+            <a:fontRef idx="minor">
+              <a:schemeClr val="lt1"/>
+            </a:fontRef>
+          </p:style>
+          <p:txBody>
+            <a:bodyPr rtlCol="0" anchor="ctr"/>
+            <a:lstStyle/>
+            <a:p>
+              <a:pPr algn="ctr"/>
+              <a:endParaRPr lang="en-US" dirty="0"/>
+            </a:p>
+          </p:txBody>
+        </p:sp>
+        <p:sp>
+          <p:nvSpPr>
+            <p:cNvPr id="7" name="Rectangle: Rounded Corners 6">
+              <a:extLst>
+                <a:ext uri="{FF2B5EF4-FFF2-40B4-BE49-F238E27FC236}">
+                  <a16:creationId xmlns:a16="http://schemas.microsoft.com/office/drawing/2014/main" id="{73818C5D-C0E0-4AAA-BA82-12EF22EE8849}"/>
+                </a:ext>
+              </a:extLst>
+            </p:cNvPr>
+            <p:cNvSpPr/>
+            <p:nvPr/>
+          </p:nvSpPr>
+          <p:spPr>
+            <a:xfrm>
+              <a:off x="3416490" y="2552266"/>
+              <a:ext cx="443552" cy="300251"/>
+            </a:xfrm>
+            <a:prstGeom prst="roundRect">
+              <a:avLst/>
+            </a:prstGeom>
+            <a:solidFill>
+              <a:schemeClr val="accent1"/>
+            </a:solidFill>
+            <a:ln>
               <a:solidFill>
-                <a:schemeClr val="accent1"/>
+                <a:srgbClr val="860708"/>
               </a:solidFill>
-            </p:spPr>
-            <p:style>
-              <a:lnRef idx="2">
-                <a:schemeClr val="accent1">
-                  <a:shade val="50000"/>
-                </a:schemeClr>
-              </a:lnRef>
-              <a:fillRef idx="1">
-                <a:schemeClr val="accent1"/>
-              </a:fillRef>
-              <a:effectRef idx="0">
-                <a:schemeClr val="accent1"/>
-              </a:effectRef>
-              <a:fontRef idx="minor">
-                <a:schemeClr val="lt1"/>
-              </a:fontRef>
-            </p:style>
-            <p:txBody>
-              <a:bodyPr rtlCol="0" anchor="ctr"/>
-              <a:lstStyle/>
-              <a:p>
-                <a:pPr algn="ctr"/>
-                <a:endParaRPr lang="en-US"/>
-              </a:p>
-            </p:txBody>
-          </p:sp>
-          <p:sp>
-            <p:nvSpPr>
-              <p:cNvPr id="24" name="Rectangle 23">
-                <a:extLst>
-                  <a:ext uri="{FF2B5EF4-FFF2-40B4-BE49-F238E27FC236}">
-                    <a16:creationId xmlns:a16="http://schemas.microsoft.com/office/drawing/2014/main" id="{7B945A2D-306C-4CD6-81CC-AB663FAB8C2E}"/>
-                  </a:ext>
-                </a:extLst>
-              </p:cNvPr>
-              <p:cNvSpPr/>
-              <p:nvPr/>
-            </p:nvSpPr>
-            <p:spPr>
-              <a:xfrm>
-                <a:off x="1364955" y="4292664"/>
-                <a:ext cx="328937" cy="307777"/>
-              </a:xfrm>
-              <a:prstGeom prst="rect">
-                <a:avLst/>
-              </a:prstGeom>
-              <a:noFill/>
-            </p:spPr>
-            <p:txBody>
-              <a:bodyPr wrap="none" lIns="91440" tIns="45720" rIns="91440" bIns="45720">
-                <a:spAutoFit/>
-              </a:bodyPr>
-              <a:lstStyle/>
-              <a:p>
-                <a:pPr algn="ctr"/>
-                <a:r>
-                  <a:rPr lang="en-US" sz="1400" b="1" cap="none" spc="50" dirty="0">
-                    <a:ln w="9525" cmpd="sng">
-                      <a:solidFill>
-                        <a:schemeClr val="accent1"/>
-                      </a:solidFill>
-                      <a:prstDash val="solid"/>
-                    </a:ln>
+              <a:headEnd type="none" w="med" len="med"/>
+              <a:tailEnd type="none" w="med" len="med"/>
+            </a:ln>
+          </p:spPr>
+          <p:style>
+            <a:lnRef idx="2">
+              <a:schemeClr val="accent1"/>
+            </a:lnRef>
+            <a:fillRef idx="1">
+              <a:schemeClr val="lt1"/>
+            </a:fillRef>
+            <a:effectRef idx="0">
+              <a:schemeClr val="accent1"/>
+            </a:effectRef>
+            <a:fontRef idx="minor">
+              <a:schemeClr val="dk1"/>
+            </a:fontRef>
+          </p:style>
+          <p:txBody>
+            <a:bodyPr rtlCol="0" anchor="ctr"/>
+            <a:lstStyle/>
+            <a:p>
+              <a:pPr algn="ctr"/>
+              <a:endParaRPr lang="en-US"/>
+            </a:p>
+          </p:txBody>
+        </p:sp>
+        <p:sp>
+          <p:nvSpPr>
+            <p:cNvPr id="8" name="Rectangle: Rounded Corners 7">
+              <a:extLst>
+                <a:ext uri="{FF2B5EF4-FFF2-40B4-BE49-F238E27FC236}">
+                  <a16:creationId xmlns:a16="http://schemas.microsoft.com/office/drawing/2014/main" id="{F50B6574-786B-4AFE-B67D-D3EBB6A6A9DF}"/>
+                </a:ext>
+              </a:extLst>
+            </p:cNvPr>
+            <p:cNvSpPr/>
+            <p:nvPr/>
+          </p:nvSpPr>
+          <p:spPr>
+            <a:xfrm>
+              <a:off x="4499212" y="2552265"/>
+              <a:ext cx="443552" cy="300251"/>
+            </a:xfrm>
+            <a:prstGeom prst="roundRect">
+              <a:avLst/>
+            </a:prstGeom>
+            <a:solidFill>
+              <a:schemeClr val="accent1"/>
+            </a:solidFill>
+            <a:ln>
+              <a:solidFill>
+                <a:srgbClr val="860708"/>
+              </a:solidFill>
+              <a:headEnd type="none" w="med" len="med"/>
+              <a:tailEnd type="none" w="med" len="med"/>
+            </a:ln>
+          </p:spPr>
+          <p:style>
+            <a:lnRef idx="2">
+              <a:schemeClr val="accent1"/>
+            </a:lnRef>
+            <a:fillRef idx="1">
+              <a:schemeClr val="lt1"/>
+            </a:fillRef>
+            <a:effectRef idx="0">
+              <a:schemeClr val="accent1"/>
+            </a:effectRef>
+            <a:fontRef idx="minor">
+              <a:schemeClr val="dk1"/>
+            </a:fontRef>
+          </p:style>
+          <p:txBody>
+            <a:bodyPr rtlCol="0" anchor="ctr"/>
+            <a:lstStyle/>
+            <a:p>
+              <a:pPr algn="ctr"/>
+              <a:endParaRPr lang="en-US"/>
+            </a:p>
+          </p:txBody>
+        </p:sp>
+        <p:cxnSp>
+          <p:nvCxnSpPr>
+            <p:cNvPr id="12" name="Straight Arrow Connector 11">
+              <a:extLst>
+                <a:ext uri="{FF2B5EF4-FFF2-40B4-BE49-F238E27FC236}">
+                  <a16:creationId xmlns:a16="http://schemas.microsoft.com/office/drawing/2014/main" id="{8892E26C-61DD-4B46-97A4-7E58337EBAA8}"/>
+                </a:ext>
+              </a:extLst>
+            </p:cNvPr>
+            <p:cNvCxnSpPr>
+              <a:cxnSpLocks/>
+            </p:cNvCxnSpPr>
+            <p:nvPr/>
+          </p:nvCxnSpPr>
+          <p:spPr>
+            <a:xfrm flipV="1">
+              <a:off x="4179627" y="2251879"/>
+              <a:ext cx="0" cy="150126"/>
+            </a:xfrm>
+            <a:prstGeom prst="straightConnector1">
+              <a:avLst/>
+            </a:prstGeom>
+            <a:ln>
+              <a:solidFill>
+                <a:schemeClr val="bg1"/>
+              </a:solidFill>
+              <a:tailEnd type="triangle"/>
+            </a:ln>
+          </p:spPr>
+          <p:style>
+            <a:lnRef idx="1">
+              <a:schemeClr val="accent1"/>
+            </a:lnRef>
+            <a:fillRef idx="0">
+              <a:schemeClr val="accent1"/>
+            </a:fillRef>
+            <a:effectRef idx="0">
+              <a:schemeClr val="accent1"/>
+            </a:effectRef>
+            <a:fontRef idx="minor">
+              <a:schemeClr val="tx1"/>
+            </a:fontRef>
+          </p:style>
+        </p:cxnSp>
+        <p:cxnSp>
+          <p:nvCxnSpPr>
+            <p:cNvPr id="13" name="Straight Arrow Connector 12">
+              <a:extLst>
+                <a:ext uri="{FF2B5EF4-FFF2-40B4-BE49-F238E27FC236}">
+                  <a16:creationId xmlns:a16="http://schemas.microsoft.com/office/drawing/2014/main" id="{2449AFD0-F555-4B5A-B910-8E24EA83E77B}"/>
+                </a:ext>
+              </a:extLst>
+            </p:cNvPr>
+            <p:cNvCxnSpPr>
+              <a:cxnSpLocks/>
+            </p:cNvCxnSpPr>
+            <p:nvPr/>
+          </p:nvCxnSpPr>
+          <p:spPr>
+            <a:xfrm>
+              <a:off x="4179627" y="2631133"/>
+              <a:ext cx="0" cy="163954"/>
+            </a:xfrm>
+            <a:prstGeom prst="straightConnector1">
+              <a:avLst/>
+            </a:prstGeom>
+            <a:ln>
+              <a:solidFill>
+                <a:schemeClr val="bg1"/>
+              </a:solidFill>
+              <a:tailEnd type="triangle"/>
+            </a:ln>
+          </p:spPr>
+          <p:style>
+            <a:lnRef idx="1">
+              <a:schemeClr val="accent1"/>
+            </a:lnRef>
+            <a:fillRef idx="0">
+              <a:schemeClr val="accent1"/>
+            </a:fillRef>
+            <a:effectRef idx="0">
+              <a:schemeClr val="accent1"/>
+            </a:effectRef>
+            <a:fontRef idx="minor">
+              <a:schemeClr val="tx1"/>
+            </a:fontRef>
+          </p:style>
+        </p:cxnSp>
+        <p:cxnSp>
+          <p:nvCxnSpPr>
+            <p:cNvPr id="20" name="Straight Arrow Connector 19">
+              <a:extLst>
+                <a:ext uri="{FF2B5EF4-FFF2-40B4-BE49-F238E27FC236}">
+                  <a16:creationId xmlns:a16="http://schemas.microsoft.com/office/drawing/2014/main" id="{EFDE3BE9-6F78-408F-AAB1-3ABF9B9E9F5B}"/>
+                </a:ext>
+              </a:extLst>
+            </p:cNvPr>
+            <p:cNvCxnSpPr>
+              <a:cxnSpLocks/>
+            </p:cNvCxnSpPr>
+            <p:nvPr/>
+          </p:nvCxnSpPr>
+          <p:spPr>
+            <a:xfrm>
+              <a:off x="4635707" y="2702390"/>
+              <a:ext cx="174659" cy="0"/>
+            </a:xfrm>
+            <a:prstGeom prst="straightConnector1">
+              <a:avLst/>
+            </a:prstGeom>
+            <a:ln>
+              <a:solidFill>
+                <a:schemeClr val="bg1"/>
+              </a:solidFill>
+              <a:tailEnd type="triangle"/>
+            </a:ln>
+          </p:spPr>
+          <p:style>
+            <a:lnRef idx="1">
+              <a:schemeClr val="accent1"/>
+            </a:lnRef>
+            <a:fillRef idx="0">
+              <a:schemeClr val="accent1"/>
+            </a:fillRef>
+            <a:effectRef idx="0">
+              <a:schemeClr val="accent1"/>
+            </a:effectRef>
+            <a:fontRef idx="minor">
+              <a:schemeClr val="tx1"/>
+            </a:fontRef>
+          </p:style>
+        </p:cxnSp>
+        <p:cxnSp>
+          <p:nvCxnSpPr>
+            <p:cNvPr id="22" name="Straight Arrow Connector 21">
+              <a:extLst>
+                <a:ext uri="{FF2B5EF4-FFF2-40B4-BE49-F238E27FC236}">
+                  <a16:creationId xmlns:a16="http://schemas.microsoft.com/office/drawing/2014/main" id="{12C35B26-0A3A-42A7-9342-BD526946D49E}"/>
+                </a:ext>
+              </a:extLst>
+            </p:cNvPr>
+            <p:cNvCxnSpPr>
+              <a:cxnSpLocks/>
+            </p:cNvCxnSpPr>
+            <p:nvPr/>
+          </p:nvCxnSpPr>
+          <p:spPr>
+            <a:xfrm flipH="1">
+              <a:off x="3551997" y="2702390"/>
+              <a:ext cx="172538" cy="0"/>
+            </a:xfrm>
+            <a:prstGeom prst="straightConnector1">
+              <a:avLst/>
+            </a:prstGeom>
+            <a:ln>
+              <a:solidFill>
+                <a:schemeClr val="bg1"/>
+              </a:solidFill>
+              <a:tailEnd type="triangle"/>
+            </a:ln>
+          </p:spPr>
+          <p:style>
+            <a:lnRef idx="1">
+              <a:schemeClr val="accent1"/>
+            </a:lnRef>
+            <a:fillRef idx="0">
+              <a:schemeClr val="accent1"/>
+            </a:fillRef>
+            <a:effectRef idx="0">
+              <a:schemeClr val="accent1"/>
+            </a:effectRef>
+            <a:fontRef idx="minor">
+              <a:schemeClr val="tx1"/>
+            </a:fontRef>
+          </p:style>
+        </p:cxnSp>
+      </p:grpSp>
+      <p:grpSp>
+        <p:nvGrpSpPr>
+          <p:cNvPr id="11" name="Group 10">
+            <a:extLst>
+              <a:ext uri="{FF2B5EF4-FFF2-40B4-BE49-F238E27FC236}">
+                <a16:creationId xmlns:a16="http://schemas.microsoft.com/office/drawing/2014/main" id="{2F8DCF8E-BBBC-482D-9A09-E7769FF93168}"/>
+              </a:ext>
+            </a:extLst>
+          </p:cNvPr>
+          <p:cNvGrpSpPr/>
+          <p:nvPr/>
+        </p:nvGrpSpPr>
+        <p:grpSpPr>
+          <a:xfrm>
+            <a:off x="2910786" y="1859536"/>
+            <a:ext cx="443552" cy="322022"/>
+            <a:chOff x="1312460" y="4287672"/>
+            <a:chExt cx="443552" cy="322022"/>
+          </a:xfrm>
+        </p:grpSpPr>
+        <p:sp>
+          <p:nvSpPr>
+            <p:cNvPr id="10" name="Rectangle: Rounded Corners 9">
+              <a:extLst>
+                <a:ext uri="{FF2B5EF4-FFF2-40B4-BE49-F238E27FC236}">
+                  <a16:creationId xmlns:a16="http://schemas.microsoft.com/office/drawing/2014/main" id="{2E090F7B-0E13-450D-810B-56B8D59F8D4D}"/>
+                </a:ext>
+              </a:extLst>
+            </p:cNvPr>
+            <p:cNvSpPr/>
+            <p:nvPr/>
+          </p:nvSpPr>
+          <p:spPr>
+            <a:xfrm>
+              <a:off x="1312460" y="4287672"/>
+              <a:ext cx="443552" cy="300251"/>
+            </a:xfrm>
+            <a:prstGeom prst="roundRect">
+              <a:avLst/>
+            </a:prstGeom>
+            <a:solidFill>
+              <a:schemeClr val="accent1"/>
+            </a:solidFill>
+          </p:spPr>
+          <p:style>
+            <a:lnRef idx="2">
+              <a:schemeClr val="accent1">
+                <a:shade val="50000"/>
+              </a:schemeClr>
+            </a:lnRef>
+            <a:fillRef idx="1">
+              <a:schemeClr val="accent1"/>
+            </a:fillRef>
+            <a:effectRef idx="0">
+              <a:schemeClr val="accent1"/>
+            </a:effectRef>
+            <a:fontRef idx="minor">
+              <a:schemeClr val="lt1"/>
+            </a:fontRef>
+          </p:style>
+          <p:txBody>
+            <a:bodyPr rtlCol="0" anchor="ctr"/>
+            <a:lstStyle/>
+            <a:p>
+              <a:pPr algn="ctr"/>
+              <a:endParaRPr lang="en-US"/>
+            </a:p>
+          </p:txBody>
+        </p:sp>
+        <p:sp>
+          <p:nvSpPr>
+            <p:cNvPr id="24" name="Rectangle 23">
+              <a:extLst>
+                <a:ext uri="{FF2B5EF4-FFF2-40B4-BE49-F238E27FC236}">
+                  <a16:creationId xmlns:a16="http://schemas.microsoft.com/office/drawing/2014/main" id="{7B945A2D-306C-4CD6-81CC-AB663FAB8C2E}"/>
+                </a:ext>
+              </a:extLst>
+            </p:cNvPr>
+            <p:cNvSpPr/>
+            <p:nvPr/>
+          </p:nvSpPr>
+          <p:spPr>
+            <a:xfrm>
+              <a:off x="1385428" y="4292664"/>
+              <a:ext cx="285340" cy="317030"/>
+            </a:xfrm>
+            <a:prstGeom prst="rect">
+              <a:avLst/>
+            </a:prstGeom>
+            <a:noFill/>
+          </p:spPr>
+          <p:txBody>
+            <a:bodyPr wrap="square" lIns="91440" tIns="45720" rIns="91440" bIns="45720">
+              <a:spAutoFit/>
+            </a:bodyPr>
+            <a:lstStyle/>
+            <a:p>
+              <a:pPr algn="ctr"/>
+              <a:r>
+                <a:rPr lang="en-US" sz="1400" b="1" spc="50" dirty="0">
+                  <a:ln w="9525" cmpd="sng">
                     <a:solidFill>
-                      <a:srgbClr val="70AD47">
-                        <a:tint val="1000"/>
-                      </a:srgbClr>
+                      <a:schemeClr val="accent1"/>
                     </a:solidFill>
-                    <a:effectLst>
-                      <a:glow rad="38100">
-                        <a:schemeClr val="accent1">
-                          <a:alpha val="40000"/>
-                        </a:schemeClr>
-                      </a:glow>
-                    </a:effectLst>
-                    <a:latin typeface="Abadi" panose="020B0604020104020204" pitchFamily="34" charset="0"/>
-                  </a:rPr>
-                  <a:t>M</a:t>
-                </a:r>
-              </a:p>
-            </p:txBody>
-          </p:sp>
-        </p:grpSp>
+                    <a:prstDash val="solid"/>
+                  </a:ln>
+                  <a:solidFill>
+                    <a:srgbClr val="70AD47">
+                      <a:tint val="1000"/>
+                    </a:srgbClr>
+                  </a:solidFill>
+                  <a:effectLst>
+                    <a:glow rad="38100">
+                      <a:schemeClr val="accent1">
+                        <a:alpha val="40000"/>
+                      </a:schemeClr>
+                    </a:glow>
+                  </a:effectLst>
+                  <a:latin typeface="Abadi" panose="020B0604020104020204" pitchFamily="34" charset="0"/>
+                </a:rPr>
+                <a:t>M</a:t>
+              </a:r>
+            </a:p>
+          </p:txBody>
+        </p:sp>
       </p:grpSp>
       <p:grpSp>
         <p:nvGrpSpPr>
@@ -7625,7 +7642,7 @@
         </p:nvGrpSpPr>
         <p:grpSpPr>
           <a:xfrm>
-            <a:off x="4625136" y="4982667"/>
+            <a:off x="5157407" y="4982667"/>
             <a:ext cx="1804093" cy="312769"/>
             <a:chOff x="2863959" y="5152341"/>
             <a:chExt cx="1804093" cy="312769"/>
@@ -7769,7 +7786,7 @@
         </p:nvGrpSpPr>
         <p:grpSpPr>
           <a:xfrm>
-            <a:off x="6929322" y="2878733"/>
+            <a:off x="7549078" y="3637938"/>
             <a:ext cx="1804093" cy="312769"/>
             <a:chOff x="2863959" y="5152341"/>
             <a:chExt cx="1804093" cy="312769"/>
@@ -7899,672 +7916,60 @@
           </p:txBody>
         </p:sp>
       </p:grpSp>
-      <p:grpSp>
-        <p:nvGrpSpPr>
-          <p:cNvPr id="15" name="Group 14">
+      <p:sp>
+        <p:nvSpPr>
+          <p:cNvPr id="44" name="Rectangle 43">
             <a:extLst>
               <a:ext uri="{FF2B5EF4-FFF2-40B4-BE49-F238E27FC236}">
-                <a16:creationId xmlns:a16="http://schemas.microsoft.com/office/drawing/2014/main" id="{5625D1C2-B10F-4349-894F-171E34A35B36}"/>
+                <a16:creationId xmlns:a16="http://schemas.microsoft.com/office/drawing/2014/main" id="{FA8A2D17-B7BF-4F75-981A-E27673DBC20D}"/>
               </a:ext>
             </a:extLst>
           </p:cNvPr>
-          <p:cNvGrpSpPr/>
+          <p:cNvSpPr/>
           <p:nvPr/>
-        </p:nvGrpSpPr>
-        <p:grpSpPr>
+        </p:nvSpPr>
+        <p:spPr>
           <a:xfrm>
-            <a:off x="6070239" y="3520929"/>
-            <a:ext cx="1761129" cy="678261"/>
-            <a:chOff x="6018492" y="3276267"/>
-            <a:chExt cx="1761129" cy="678261"/>
+            <a:off x="9747653" y="3742344"/>
+            <a:ext cx="1424539" cy="45719"/>
           </a:xfrm>
-        </p:grpSpPr>
-        <p:grpSp>
-          <p:nvGrpSpPr>
-            <p:cNvPr id="31" name="Group 30">
-              <a:extLst>
-                <a:ext uri="{FF2B5EF4-FFF2-40B4-BE49-F238E27FC236}">
-                  <a16:creationId xmlns:a16="http://schemas.microsoft.com/office/drawing/2014/main" id="{C18B8526-A775-4007-8E7D-A2CF8F2F849C}"/>
-                </a:ext>
-              </a:extLst>
-            </p:cNvPr>
-            <p:cNvGrpSpPr/>
-            <p:nvPr/>
-          </p:nvGrpSpPr>
-          <p:grpSpPr>
-            <a:xfrm>
-              <a:off x="6253347" y="3285653"/>
-              <a:ext cx="1526274" cy="668875"/>
-              <a:chOff x="3416490" y="2183642"/>
-              <a:chExt cx="1526274" cy="668875"/>
-            </a:xfrm>
-          </p:grpSpPr>
-          <p:sp>
-            <p:nvSpPr>
-              <p:cNvPr id="32" name="Rectangle: Rounded Corners 31">
-                <a:extLst>
-                  <a:ext uri="{FF2B5EF4-FFF2-40B4-BE49-F238E27FC236}">
-                    <a16:creationId xmlns:a16="http://schemas.microsoft.com/office/drawing/2014/main" id="{E2254923-E1FE-461B-A16C-BEA89BFC742F}"/>
-                  </a:ext>
-                </a:extLst>
-              </p:cNvPr>
-              <p:cNvSpPr/>
-              <p:nvPr/>
-            </p:nvSpPr>
-            <p:spPr>
-              <a:xfrm>
-                <a:off x="3957851" y="2183642"/>
-                <a:ext cx="443552" cy="300251"/>
-              </a:xfrm>
-              <a:prstGeom prst="roundRect">
-                <a:avLst/>
-              </a:prstGeom>
-            </p:spPr>
-            <p:style>
-              <a:lnRef idx="2">
-                <a:schemeClr val="accent1">
-                  <a:shade val="50000"/>
-                </a:schemeClr>
-              </a:lnRef>
-              <a:fillRef idx="1">
-                <a:schemeClr val="accent1"/>
-              </a:fillRef>
-              <a:effectRef idx="0">
-                <a:schemeClr val="accent1"/>
-              </a:effectRef>
-              <a:fontRef idx="minor">
-                <a:schemeClr val="lt1"/>
-              </a:fontRef>
-            </p:style>
-            <p:txBody>
-              <a:bodyPr rtlCol="0" anchor="ctr"/>
-              <a:lstStyle/>
-              <a:p>
-                <a:pPr algn="ctr"/>
-                <a:endParaRPr lang="en-US"/>
-              </a:p>
-            </p:txBody>
-          </p:sp>
-          <p:sp>
-            <p:nvSpPr>
-              <p:cNvPr id="33" name="Rectangle: Rounded Corners 32">
-                <a:extLst>
-                  <a:ext uri="{FF2B5EF4-FFF2-40B4-BE49-F238E27FC236}">
-                    <a16:creationId xmlns:a16="http://schemas.microsoft.com/office/drawing/2014/main" id="{D2AD770E-66C4-4270-81FC-4099AA5B0297}"/>
-                  </a:ext>
-                </a:extLst>
-              </p:cNvPr>
-              <p:cNvSpPr/>
-              <p:nvPr/>
-            </p:nvSpPr>
-            <p:spPr>
-              <a:xfrm>
-                <a:off x="3957851" y="2552266"/>
-                <a:ext cx="443552" cy="300251"/>
-              </a:xfrm>
-              <a:prstGeom prst="roundRect">
-                <a:avLst/>
-              </a:prstGeom>
-            </p:spPr>
-            <p:style>
-              <a:lnRef idx="2">
-                <a:schemeClr val="accent1">
-                  <a:shade val="50000"/>
-                </a:schemeClr>
-              </a:lnRef>
-              <a:fillRef idx="1">
-                <a:schemeClr val="accent1"/>
-              </a:fillRef>
-              <a:effectRef idx="0">
-                <a:schemeClr val="accent1"/>
-              </a:effectRef>
-              <a:fontRef idx="minor">
-                <a:schemeClr val="lt1"/>
-              </a:fontRef>
-            </p:style>
-            <p:txBody>
-              <a:bodyPr rtlCol="0" anchor="ctr"/>
-              <a:lstStyle/>
-              <a:p>
-                <a:pPr algn="ctr"/>
-                <a:endParaRPr lang="en-US"/>
-              </a:p>
-            </p:txBody>
-          </p:sp>
-          <p:sp>
-            <p:nvSpPr>
-              <p:cNvPr id="34" name="Rectangle: Rounded Corners 33">
-                <a:extLst>
-                  <a:ext uri="{FF2B5EF4-FFF2-40B4-BE49-F238E27FC236}">
-                    <a16:creationId xmlns:a16="http://schemas.microsoft.com/office/drawing/2014/main" id="{293D80B2-074C-435C-B5E0-0D64AF3E225D}"/>
-                  </a:ext>
-                </a:extLst>
-              </p:cNvPr>
-              <p:cNvSpPr/>
-              <p:nvPr/>
-            </p:nvSpPr>
-            <p:spPr>
-              <a:xfrm>
-                <a:off x="3416490" y="2552266"/>
-                <a:ext cx="443552" cy="300251"/>
-              </a:xfrm>
-              <a:prstGeom prst="roundRect">
-                <a:avLst/>
-              </a:prstGeom>
-              <a:solidFill>
-                <a:schemeClr val="tx2">
-                  <a:lumMod val="40000"/>
-                  <a:lumOff val="60000"/>
-                </a:schemeClr>
-              </a:solidFill>
-              <a:ln>
-                <a:headEnd type="none" w="med" len="med"/>
-                <a:tailEnd type="none" w="med" len="med"/>
-              </a:ln>
-            </p:spPr>
-            <p:style>
-              <a:lnRef idx="2">
-                <a:schemeClr val="accent1"/>
-              </a:lnRef>
-              <a:fillRef idx="1">
-                <a:schemeClr val="lt1"/>
-              </a:fillRef>
-              <a:effectRef idx="0">
-                <a:schemeClr val="accent1"/>
-              </a:effectRef>
-              <a:fontRef idx="minor">
-                <a:schemeClr val="dk1"/>
-              </a:fontRef>
-            </p:style>
-            <p:txBody>
-              <a:bodyPr rtlCol="0" anchor="ctr"/>
-              <a:lstStyle/>
-              <a:p>
-                <a:pPr algn="ctr"/>
-                <a:endParaRPr lang="en-US"/>
-              </a:p>
-            </p:txBody>
-          </p:sp>
-          <p:sp>
-            <p:nvSpPr>
-              <p:cNvPr id="35" name="Rectangle: Rounded Corners 34">
-                <a:extLst>
-                  <a:ext uri="{FF2B5EF4-FFF2-40B4-BE49-F238E27FC236}">
-                    <a16:creationId xmlns:a16="http://schemas.microsoft.com/office/drawing/2014/main" id="{2B95F331-1A52-44C9-83CE-19BC866BE78E}"/>
-                  </a:ext>
-                </a:extLst>
-              </p:cNvPr>
-              <p:cNvSpPr/>
-              <p:nvPr/>
-            </p:nvSpPr>
-            <p:spPr>
-              <a:xfrm>
-                <a:off x="4499212" y="2552265"/>
-                <a:ext cx="443552" cy="300251"/>
-              </a:xfrm>
-              <a:prstGeom prst="roundRect">
-                <a:avLst/>
-              </a:prstGeom>
-              <a:solidFill>
-                <a:schemeClr val="tx2">
-                  <a:lumMod val="40000"/>
-                  <a:lumOff val="60000"/>
-                </a:schemeClr>
-              </a:solidFill>
-              <a:ln>
-                <a:headEnd type="none" w="med" len="med"/>
-                <a:tailEnd type="none" w="med" len="med"/>
-              </a:ln>
-            </p:spPr>
-            <p:style>
-              <a:lnRef idx="2">
-                <a:schemeClr val="accent1"/>
-              </a:lnRef>
-              <a:fillRef idx="1">
-                <a:schemeClr val="lt1"/>
-              </a:fillRef>
-              <a:effectRef idx="0">
-                <a:schemeClr val="accent1"/>
-              </a:effectRef>
-              <a:fontRef idx="minor">
-                <a:schemeClr val="dk1"/>
-              </a:fontRef>
-            </p:style>
-            <p:txBody>
-              <a:bodyPr rtlCol="0" anchor="ctr"/>
-              <a:lstStyle/>
-              <a:p>
-                <a:pPr algn="ctr"/>
-                <a:endParaRPr lang="en-US"/>
-              </a:p>
-            </p:txBody>
-          </p:sp>
-          <p:cxnSp>
-            <p:nvCxnSpPr>
-              <p:cNvPr id="36" name="Straight Arrow Connector 35">
-                <a:extLst>
-                  <a:ext uri="{FF2B5EF4-FFF2-40B4-BE49-F238E27FC236}">
-                    <a16:creationId xmlns:a16="http://schemas.microsoft.com/office/drawing/2014/main" id="{0D67CBE7-D963-49C6-80B7-05AFB5EDA46E}"/>
-                  </a:ext>
-                </a:extLst>
-              </p:cNvPr>
-              <p:cNvCxnSpPr>
-                <a:cxnSpLocks/>
-              </p:cNvCxnSpPr>
-              <p:nvPr/>
-            </p:nvCxnSpPr>
-            <p:spPr>
-              <a:xfrm flipV="1">
-                <a:off x="4179627" y="2251879"/>
-                <a:ext cx="0" cy="150126"/>
-              </a:xfrm>
-              <a:prstGeom prst="straightConnector1">
-                <a:avLst/>
-              </a:prstGeom>
-              <a:ln>
-                <a:solidFill>
-                  <a:schemeClr val="bg1"/>
-                </a:solidFill>
-                <a:tailEnd type="triangle"/>
-              </a:ln>
-            </p:spPr>
-            <p:style>
-              <a:lnRef idx="1">
-                <a:schemeClr val="accent1"/>
-              </a:lnRef>
-              <a:fillRef idx="0">
-                <a:schemeClr val="accent1"/>
-              </a:fillRef>
-              <a:effectRef idx="0">
-                <a:schemeClr val="accent1"/>
-              </a:effectRef>
-              <a:fontRef idx="minor">
-                <a:schemeClr val="tx1"/>
-              </a:fontRef>
-            </p:style>
-          </p:cxnSp>
-          <p:cxnSp>
-            <p:nvCxnSpPr>
-              <p:cNvPr id="37" name="Straight Arrow Connector 36">
-                <a:extLst>
-                  <a:ext uri="{FF2B5EF4-FFF2-40B4-BE49-F238E27FC236}">
-                    <a16:creationId xmlns:a16="http://schemas.microsoft.com/office/drawing/2014/main" id="{DD038403-C083-4DAC-A0C2-506CBC931457}"/>
-                  </a:ext>
-                </a:extLst>
-              </p:cNvPr>
-              <p:cNvCxnSpPr>
-                <a:cxnSpLocks/>
-              </p:cNvCxnSpPr>
-              <p:nvPr/>
-            </p:nvCxnSpPr>
-            <p:spPr>
-              <a:xfrm>
-                <a:off x="4179627" y="2631133"/>
-                <a:ext cx="0" cy="163954"/>
-              </a:xfrm>
-              <a:prstGeom prst="straightConnector1">
-                <a:avLst/>
-              </a:prstGeom>
-              <a:ln>
-                <a:solidFill>
-                  <a:schemeClr val="bg1"/>
-                </a:solidFill>
-                <a:tailEnd type="triangle"/>
-              </a:ln>
-            </p:spPr>
-            <p:style>
-              <a:lnRef idx="1">
-                <a:schemeClr val="accent1"/>
-              </a:lnRef>
-              <a:fillRef idx="0">
-                <a:schemeClr val="accent1"/>
-              </a:fillRef>
-              <a:effectRef idx="0">
-                <a:schemeClr val="accent1"/>
-              </a:effectRef>
-              <a:fontRef idx="minor">
-                <a:schemeClr val="tx1"/>
-              </a:fontRef>
-            </p:style>
-          </p:cxnSp>
-          <p:cxnSp>
-            <p:nvCxnSpPr>
-              <p:cNvPr id="38" name="Straight Arrow Connector 37">
-                <a:extLst>
-                  <a:ext uri="{FF2B5EF4-FFF2-40B4-BE49-F238E27FC236}">
-                    <a16:creationId xmlns:a16="http://schemas.microsoft.com/office/drawing/2014/main" id="{7B3E2155-D59B-4340-B90C-DBF71076B294}"/>
-                  </a:ext>
-                </a:extLst>
-              </p:cNvPr>
-              <p:cNvCxnSpPr>
-                <a:cxnSpLocks/>
-              </p:cNvCxnSpPr>
-              <p:nvPr/>
-            </p:nvCxnSpPr>
-            <p:spPr>
-              <a:xfrm>
-                <a:off x="4635707" y="2702390"/>
-                <a:ext cx="174659" cy="0"/>
-              </a:xfrm>
-              <a:prstGeom prst="straightConnector1">
-                <a:avLst/>
-              </a:prstGeom>
-              <a:ln>
-                <a:solidFill>
-                  <a:schemeClr val="bg1"/>
-                </a:solidFill>
-                <a:tailEnd type="triangle"/>
-              </a:ln>
-            </p:spPr>
-            <p:style>
-              <a:lnRef idx="1">
-                <a:schemeClr val="accent1"/>
-              </a:lnRef>
-              <a:fillRef idx="0">
-                <a:schemeClr val="accent1"/>
-              </a:fillRef>
-              <a:effectRef idx="0">
-                <a:schemeClr val="accent1"/>
-              </a:effectRef>
-              <a:fontRef idx="minor">
-                <a:schemeClr val="tx1"/>
-              </a:fontRef>
-            </p:style>
-          </p:cxnSp>
-          <p:cxnSp>
-            <p:nvCxnSpPr>
-              <p:cNvPr id="39" name="Straight Arrow Connector 38">
-                <a:extLst>
-                  <a:ext uri="{FF2B5EF4-FFF2-40B4-BE49-F238E27FC236}">
-                    <a16:creationId xmlns:a16="http://schemas.microsoft.com/office/drawing/2014/main" id="{8886EC48-ED77-4E83-BAE7-B795F7AC6B2E}"/>
-                  </a:ext>
-                </a:extLst>
-              </p:cNvPr>
-              <p:cNvCxnSpPr>
-                <a:cxnSpLocks/>
-              </p:cNvCxnSpPr>
-              <p:nvPr/>
-            </p:nvCxnSpPr>
-            <p:spPr>
-              <a:xfrm flipH="1">
-                <a:off x="3551997" y="2702390"/>
-                <a:ext cx="172538" cy="0"/>
-              </a:xfrm>
-              <a:prstGeom prst="straightConnector1">
-                <a:avLst/>
-              </a:prstGeom>
-              <a:ln>
-                <a:solidFill>
-                  <a:schemeClr val="bg1"/>
-                </a:solidFill>
-                <a:tailEnd type="triangle"/>
-              </a:ln>
-            </p:spPr>
-            <p:style>
-              <a:lnRef idx="1">
-                <a:schemeClr val="accent1"/>
-              </a:lnRef>
-              <a:fillRef idx="0">
-                <a:schemeClr val="accent1"/>
-              </a:fillRef>
-              <a:effectRef idx="0">
-                <a:schemeClr val="accent1"/>
-              </a:effectRef>
-              <a:fontRef idx="minor">
-                <a:schemeClr val="tx1"/>
-              </a:fontRef>
-            </p:style>
-          </p:cxnSp>
-        </p:grpSp>
-        <p:grpSp>
-          <p:nvGrpSpPr>
-            <p:cNvPr id="40" name="Group 39">
-              <a:extLst>
-                <a:ext uri="{FF2B5EF4-FFF2-40B4-BE49-F238E27FC236}">
-                  <a16:creationId xmlns:a16="http://schemas.microsoft.com/office/drawing/2014/main" id="{CAFF009B-FE8C-4B86-BEBF-DD0C1033FECD}"/>
-                </a:ext>
-              </a:extLst>
-            </p:cNvPr>
-            <p:cNvGrpSpPr/>
-            <p:nvPr/>
-          </p:nvGrpSpPr>
-          <p:grpSpPr>
-            <a:xfrm>
-              <a:off x="6018492" y="3276267"/>
-              <a:ext cx="443552" cy="312769"/>
-              <a:chOff x="1312460" y="4287672"/>
-              <a:chExt cx="443552" cy="312769"/>
-            </a:xfrm>
-          </p:grpSpPr>
-          <p:sp>
-            <p:nvSpPr>
-              <p:cNvPr id="41" name="Rectangle: Rounded Corners 40">
-                <a:extLst>
-                  <a:ext uri="{FF2B5EF4-FFF2-40B4-BE49-F238E27FC236}">
-                    <a16:creationId xmlns:a16="http://schemas.microsoft.com/office/drawing/2014/main" id="{205C974A-C7DF-4873-ADD4-73E7D6527B74}"/>
-                  </a:ext>
-                </a:extLst>
-              </p:cNvPr>
-              <p:cNvSpPr/>
-              <p:nvPr/>
-            </p:nvSpPr>
-            <p:spPr>
-              <a:xfrm>
-                <a:off x="1312460" y="4287672"/>
-                <a:ext cx="443552" cy="300251"/>
-              </a:xfrm>
-              <a:prstGeom prst="roundRect">
-                <a:avLst/>
-              </a:prstGeom>
-            </p:spPr>
-            <p:style>
-              <a:lnRef idx="2">
-                <a:schemeClr val="accent1">
-                  <a:shade val="50000"/>
-                </a:schemeClr>
-              </a:lnRef>
-              <a:fillRef idx="1">
-                <a:schemeClr val="accent1"/>
-              </a:fillRef>
-              <a:effectRef idx="0">
-                <a:schemeClr val="accent1"/>
-              </a:effectRef>
-              <a:fontRef idx="minor">
-                <a:schemeClr val="lt1"/>
-              </a:fontRef>
-            </p:style>
-            <p:txBody>
-              <a:bodyPr rtlCol="0" anchor="ctr"/>
-              <a:lstStyle/>
-              <a:p>
-                <a:pPr algn="ctr"/>
-                <a:endParaRPr lang="en-US"/>
-              </a:p>
-            </p:txBody>
-          </p:sp>
-          <p:sp>
-            <p:nvSpPr>
-              <p:cNvPr id="42" name="Rectangle 41">
-                <a:extLst>
-                  <a:ext uri="{FF2B5EF4-FFF2-40B4-BE49-F238E27FC236}">
-                    <a16:creationId xmlns:a16="http://schemas.microsoft.com/office/drawing/2014/main" id="{C8B788E2-5163-4C99-A0CA-6350FEC9A565}"/>
-                  </a:ext>
-                </a:extLst>
-              </p:cNvPr>
-              <p:cNvSpPr/>
-              <p:nvPr/>
-            </p:nvSpPr>
-            <p:spPr>
-              <a:xfrm>
-                <a:off x="1387398" y="4292664"/>
-                <a:ext cx="284052" cy="307777"/>
-              </a:xfrm>
-              <a:prstGeom prst="rect">
-                <a:avLst/>
-              </a:prstGeom>
-              <a:noFill/>
-            </p:spPr>
-            <p:txBody>
-              <a:bodyPr wrap="none" lIns="91440" tIns="45720" rIns="91440" bIns="45720">
-                <a:spAutoFit/>
-              </a:bodyPr>
-              <a:lstStyle/>
-              <a:p>
-                <a:pPr algn="ctr"/>
-                <a:r>
-                  <a:rPr lang="en-US" sz="1400" b="1" cap="none" spc="50" dirty="0">
-                    <a:ln w="9525" cmpd="sng">
-                      <a:solidFill>
-                        <a:schemeClr val="accent1"/>
-                      </a:solidFill>
-                      <a:prstDash val="solid"/>
-                    </a:ln>
-                    <a:solidFill>
-                      <a:srgbClr val="70AD47">
-                        <a:tint val="1000"/>
-                      </a:srgbClr>
-                    </a:solidFill>
-                    <a:effectLst>
-                      <a:glow rad="38100">
-                        <a:schemeClr val="accent1">
-                          <a:alpha val="40000"/>
-                        </a:schemeClr>
-                      </a:glow>
-                    </a:effectLst>
-                    <a:latin typeface="Abadi" panose="020B0604020104020204" pitchFamily="34" charset="0"/>
-                  </a:rPr>
-                  <a:t>S</a:t>
-                </a:r>
-              </a:p>
-            </p:txBody>
-          </p:sp>
-        </p:grpSp>
-      </p:grpSp>
-      <p:grpSp>
-        <p:nvGrpSpPr>
-          <p:cNvPr id="43" name="Group 42">
-            <a:extLst>
-              <a:ext uri="{FF2B5EF4-FFF2-40B4-BE49-F238E27FC236}">
-                <a16:creationId xmlns:a16="http://schemas.microsoft.com/office/drawing/2014/main" id="{112B9823-02FA-4518-AD84-5ECD9E60BB5B}"/>
-              </a:ext>
-            </a:extLst>
-          </p:cNvPr>
-          <p:cNvGrpSpPr/>
-          <p:nvPr/>
-        </p:nvGrpSpPr>
-        <p:grpSpPr>
-          <a:xfrm>
-            <a:off x="8402855" y="1810616"/>
-            <a:ext cx="1424539" cy="240418"/>
-            <a:chOff x="2916455" y="4287672"/>
-            <a:chExt cx="1424539" cy="240418"/>
-          </a:xfrm>
-        </p:grpSpPr>
-        <p:sp>
-          <p:nvSpPr>
-            <p:cNvPr id="44" name="Rectangle 43">
-              <a:extLst>
-                <a:ext uri="{FF2B5EF4-FFF2-40B4-BE49-F238E27FC236}">
-                  <a16:creationId xmlns:a16="http://schemas.microsoft.com/office/drawing/2014/main" id="{FA8A2D17-B7BF-4F75-981A-E27673DBC20D}"/>
-                </a:ext>
-              </a:extLst>
-            </p:cNvPr>
-            <p:cNvSpPr/>
-            <p:nvPr/>
-          </p:nvSpPr>
-          <p:spPr>
-            <a:xfrm>
-              <a:off x="2916455" y="4287672"/>
-              <a:ext cx="1424539" cy="45719"/>
-            </a:xfrm>
-            <a:prstGeom prst="rect">
-              <a:avLst/>
-            </a:prstGeom>
+          <a:prstGeom prst="rect">
+            <a:avLst/>
+          </a:prstGeom>
+          <a:solidFill>
+            <a:srgbClr val="00B0F0"/>
+          </a:solidFill>
+          <a:ln>
             <a:solidFill>
               <a:srgbClr val="00B0F0"/>
             </a:solidFill>
-            <a:ln>
-              <a:solidFill>
-                <a:srgbClr val="00B0F0"/>
-              </a:solidFill>
-            </a:ln>
-          </p:spPr>
-          <p:style>
-            <a:lnRef idx="2">
-              <a:schemeClr val="accent1">
-                <a:shade val="50000"/>
-              </a:schemeClr>
-            </a:lnRef>
-            <a:fillRef idx="1">
-              <a:schemeClr val="accent1"/>
-            </a:fillRef>
-            <a:effectRef idx="0">
-              <a:schemeClr val="accent1"/>
-            </a:effectRef>
-            <a:fontRef idx="minor">
-              <a:schemeClr val="lt1"/>
-            </a:fontRef>
-          </p:style>
-          <p:txBody>
-            <a:bodyPr rtlCol="0" anchor="ctr"/>
-            <a:lstStyle/>
-            <a:p>
-              <a:pPr algn="ctr"/>
-              <a:endParaRPr lang="en-US"/>
-            </a:p>
-          </p:txBody>
-        </p:sp>
-        <p:sp>
-          <p:nvSpPr>
-            <p:cNvPr id="45" name="Half Frame 44">
-              <a:extLst>
-                <a:ext uri="{FF2B5EF4-FFF2-40B4-BE49-F238E27FC236}">
-                  <a16:creationId xmlns:a16="http://schemas.microsoft.com/office/drawing/2014/main" id="{19791EEE-E4A4-444E-8640-82A13D54C910}"/>
-                </a:ext>
-              </a:extLst>
-            </p:cNvPr>
-            <p:cNvSpPr/>
-            <p:nvPr/>
-          </p:nvSpPr>
-          <p:spPr>
-            <a:xfrm rot="895553">
-              <a:off x="3628824" y="4365015"/>
-              <a:ext cx="174659" cy="163075"/>
-            </a:xfrm>
-            <a:prstGeom prst="halfFrame">
-              <a:avLst/>
-            </a:prstGeom>
-          </p:spPr>
-          <p:style>
-            <a:lnRef idx="2">
-              <a:schemeClr val="accent1">
-                <a:shade val="50000"/>
-              </a:schemeClr>
-            </a:lnRef>
-            <a:fillRef idx="1">
-              <a:schemeClr val="accent1"/>
-            </a:fillRef>
-            <a:effectRef idx="0">
-              <a:schemeClr val="accent1"/>
-            </a:effectRef>
-            <a:fontRef idx="minor">
-              <a:schemeClr val="lt1"/>
-            </a:fontRef>
-          </p:style>
-          <p:txBody>
-            <a:bodyPr rtlCol="0" anchor="ctr"/>
-            <a:lstStyle/>
-            <a:p>
-              <a:pPr algn="ctr"/>
-              <a:endParaRPr lang="en-US">
-                <a:solidFill>
-                  <a:schemeClr val="tx1"/>
-                </a:solidFill>
-              </a:endParaRPr>
-            </a:p>
-          </p:txBody>
-        </p:sp>
-      </p:grpSp>
+          </a:ln>
+        </p:spPr>
+        <p:style>
+          <a:lnRef idx="2">
+            <a:schemeClr val="accent1">
+              <a:shade val="50000"/>
+            </a:schemeClr>
+          </a:lnRef>
+          <a:fillRef idx="1">
+            <a:schemeClr val="accent1"/>
+          </a:fillRef>
+          <a:effectRef idx="0">
+            <a:schemeClr val="accent1"/>
+          </a:effectRef>
+          <a:fontRef idx="minor">
+            <a:schemeClr val="lt1"/>
+          </a:fontRef>
+        </p:style>
+        <p:txBody>
+          <a:bodyPr rtlCol="0" anchor="ctr"/>
+          <a:lstStyle/>
+          <a:p>
+            <a:pPr algn="ctr"/>
+            <a:endParaRPr lang="en-US"/>
+          </a:p>
+        </p:txBody>
+      </p:sp>
       <p:pic>
         <p:nvPicPr>
           <p:cNvPr id="16" name="Picture 15">
@@ -8598,7 +8003,7 @@
         </p:blipFill>
         <p:spPr>
           <a:xfrm flipH="1">
-            <a:off x="8582373" y="3432940"/>
+            <a:off x="9933511" y="3992507"/>
             <a:ext cx="395149" cy="837988"/>
           </a:xfrm>
           <a:prstGeom prst="rect">
@@ -8639,7 +8044,7 @@
         </p:blipFill>
         <p:spPr>
           <a:xfrm>
-            <a:off x="8003534" y="3443474"/>
+            <a:off x="9354672" y="4003041"/>
             <a:ext cx="392981" cy="833390"/>
           </a:xfrm>
           <a:prstGeom prst="rect">
@@ -8647,12 +8052,127 @@
           </a:prstGeom>
         </p:spPr>
       </p:pic>
+      <p:sp>
+        <p:nvSpPr>
+          <p:cNvPr id="18" name="Half Frame 17">
+            <a:extLst>
+              <a:ext uri="{FF2B5EF4-FFF2-40B4-BE49-F238E27FC236}">
+                <a16:creationId xmlns:a16="http://schemas.microsoft.com/office/drawing/2014/main" id="{02AEFD1A-BB0E-49FA-9755-D91C99E5E16E}"/>
+              </a:ext>
+            </a:extLst>
+          </p:cNvPr>
+          <p:cNvSpPr/>
+          <p:nvPr/>
+        </p:nvSpPr>
+        <p:spPr>
+          <a:xfrm rot="1717341" flipH="1">
+            <a:off x="7281540" y="4871632"/>
+            <a:ext cx="233648" cy="619896"/>
+          </a:xfrm>
+          <a:prstGeom prst="halfFrame">
+            <a:avLst>
+              <a:gd name="adj1" fmla="val 18621"/>
+              <a:gd name="adj2" fmla="val 17559"/>
+            </a:avLst>
+          </a:prstGeom>
+          <a:solidFill>
+            <a:srgbClr val="00FF00"/>
+          </a:solidFill>
+          <a:ln>
+            <a:solidFill>
+              <a:schemeClr val="tx1"/>
+            </a:solidFill>
+          </a:ln>
+        </p:spPr>
+        <p:style>
+          <a:lnRef idx="2">
+            <a:schemeClr val="accent1">
+              <a:shade val="50000"/>
+            </a:schemeClr>
+          </a:lnRef>
+          <a:fillRef idx="1">
+            <a:schemeClr val="accent1"/>
+          </a:fillRef>
+          <a:effectRef idx="0">
+            <a:schemeClr val="accent1"/>
+          </a:effectRef>
+          <a:fontRef idx="minor">
+            <a:schemeClr val="lt1"/>
+          </a:fontRef>
+        </p:style>
+        <p:txBody>
+          <a:bodyPr rtlCol="0" anchor="ctr"/>
+          <a:lstStyle/>
+          <a:p>
+            <a:pPr algn="ctr"/>
+            <a:endParaRPr lang="en-US" dirty="0">
+              <a:solidFill>
+                <a:schemeClr val="tx1"/>
+              </a:solidFill>
+            </a:endParaRPr>
+          </a:p>
+        </p:txBody>
+      </p:sp>
+      <p:sp>
+        <p:nvSpPr>
+          <p:cNvPr id="49" name="Rectangle 48">
+            <a:extLst>
+              <a:ext uri="{FF2B5EF4-FFF2-40B4-BE49-F238E27FC236}">
+                <a16:creationId xmlns:a16="http://schemas.microsoft.com/office/drawing/2014/main" id="{D9AF24CF-96A4-40D5-94DF-639E88BC2029}"/>
+              </a:ext>
+            </a:extLst>
+          </p:cNvPr>
+          <p:cNvSpPr/>
+          <p:nvPr/>
+        </p:nvSpPr>
+        <p:spPr>
+          <a:xfrm rot="5400000" flipH="1">
+            <a:off x="7343548" y="5119517"/>
+            <a:ext cx="691394" cy="46107"/>
+          </a:xfrm>
+          <a:prstGeom prst="rect">
+            <a:avLst/>
+          </a:prstGeom>
+          <a:solidFill>
+            <a:srgbClr val="00B0F0"/>
+          </a:solidFill>
+          <a:ln>
+            <a:solidFill>
+              <a:srgbClr val="00B0F0"/>
+            </a:solidFill>
+          </a:ln>
+        </p:spPr>
+        <p:style>
+          <a:lnRef idx="2">
+            <a:schemeClr val="accent1">
+              <a:shade val="50000"/>
+            </a:schemeClr>
+          </a:lnRef>
+          <a:fillRef idx="1">
+            <a:schemeClr val="accent1"/>
+          </a:fillRef>
+          <a:effectRef idx="0">
+            <a:schemeClr val="accent1"/>
+          </a:effectRef>
+          <a:fontRef idx="minor">
+            <a:schemeClr val="lt1"/>
+          </a:fontRef>
+        </p:style>
+        <p:txBody>
+          <a:bodyPr rtlCol="0" anchor="ctr"/>
+          <a:lstStyle/>
+          <a:p>
+            <a:pPr algn="ctr"/>
+            <a:endParaRPr lang="en-US"/>
+          </a:p>
+        </p:txBody>
+      </p:sp>
       <p:grpSp>
         <p:nvGrpSpPr>
-          <p:cNvPr id="19" name="Group 18">
+          <p:cNvPr id="26" name="Group 25">
             <a:extLst>
               <a:ext uri="{FF2B5EF4-FFF2-40B4-BE49-F238E27FC236}">
-                <a16:creationId xmlns:a16="http://schemas.microsoft.com/office/drawing/2014/main" id="{6E13CB7E-560C-4BB7-945F-D8321A3FF16B}"/>
+                <a16:creationId xmlns:a16="http://schemas.microsoft.com/office/drawing/2014/main" id="{C1EAE9E5-FE7E-460D-9337-7DC1E5859B81}"/>
               </a:ext>
             </a:extLst>
           </p:cNvPr>
@@ -8660,19 +8180,19 @@
           <p:nvPr/>
         </p:nvGrpSpPr>
         <p:grpSpPr>
-          <a:xfrm flipH="1">
-            <a:off x="6168580" y="4796874"/>
-            <a:ext cx="1011449" cy="1911109"/>
-            <a:chOff x="6643364" y="4915110"/>
-            <a:chExt cx="1011449" cy="1911109"/>
+          <a:xfrm>
+            <a:off x="4400667" y="3109964"/>
+            <a:ext cx="443552" cy="319036"/>
+            <a:chOff x="3868396" y="3109964"/>
+            <a:chExt cx="443552" cy="319036"/>
           </a:xfrm>
         </p:grpSpPr>
         <p:sp>
           <p:nvSpPr>
-            <p:cNvPr id="18" name="Half Frame 17">
+            <p:cNvPr id="46" name="Rectangle: Rounded Corners 45">
               <a:extLst>
                 <a:ext uri="{FF2B5EF4-FFF2-40B4-BE49-F238E27FC236}">
-                  <a16:creationId xmlns:a16="http://schemas.microsoft.com/office/drawing/2014/main" id="{02AEFD1A-BB0E-49FA-9755-D91C99E5E16E}"/>
+                  <a16:creationId xmlns:a16="http://schemas.microsoft.com/office/drawing/2014/main" id="{9FB8102E-D1CA-4E2D-BA6D-D03F1DB4263D}"/>
                 </a:ext>
               </a:extLst>
             </p:cNvPr>
@@ -8680,22 +8200,205 @@
             <p:nvPr/>
           </p:nvSpPr>
           <p:spPr>
-            <a:xfrm rot="19882659">
-              <a:off x="7098688" y="5043215"/>
-              <a:ext cx="556125" cy="1783004"/>
+            <a:xfrm>
+              <a:off x="3868396" y="3109964"/>
+              <a:ext cx="443552" cy="300251"/>
             </a:xfrm>
-            <a:prstGeom prst="halfFrame">
-              <a:avLst>
-                <a:gd name="adj1" fmla="val 18621"/>
-                <a:gd name="adj2" fmla="val 17559"/>
-              </a:avLst>
+            <a:prstGeom prst="roundRect">
+              <a:avLst/>
             </a:prstGeom>
             <a:solidFill>
-              <a:srgbClr val="00FF00"/>
+              <a:schemeClr val="accent1"/>
+            </a:solidFill>
+          </p:spPr>
+          <p:style>
+            <a:lnRef idx="2">
+              <a:schemeClr val="accent1">
+                <a:shade val="50000"/>
+              </a:schemeClr>
+            </a:lnRef>
+            <a:fillRef idx="1">
+              <a:schemeClr val="accent1"/>
+            </a:fillRef>
+            <a:effectRef idx="0">
+              <a:schemeClr val="accent1"/>
+            </a:effectRef>
+            <a:fontRef idx="minor">
+              <a:schemeClr val="lt1"/>
+            </a:fontRef>
+          </p:style>
+          <p:txBody>
+            <a:bodyPr rtlCol="0" anchor="ctr"/>
+            <a:lstStyle/>
+            <a:p>
+              <a:pPr algn="ctr"/>
+              <a:endParaRPr lang="en-US"/>
+            </a:p>
+          </p:txBody>
+        </p:sp>
+        <p:sp>
+          <p:nvSpPr>
+            <p:cNvPr id="48" name="Rectangle 47">
+              <a:extLst>
+                <a:ext uri="{FF2B5EF4-FFF2-40B4-BE49-F238E27FC236}">
+                  <a16:creationId xmlns:a16="http://schemas.microsoft.com/office/drawing/2014/main" id="{801599C8-7962-4784-AE2D-2BDCE571A413}"/>
+                </a:ext>
+              </a:extLst>
+            </p:cNvPr>
+            <p:cNvSpPr/>
+            <p:nvPr/>
+          </p:nvSpPr>
+          <p:spPr>
+            <a:xfrm>
+              <a:off x="3947502" y="3111970"/>
+              <a:ext cx="285340" cy="317030"/>
+            </a:xfrm>
+            <a:prstGeom prst="rect">
+              <a:avLst/>
+            </a:prstGeom>
+            <a:noFill/>
+          </p:spPr>
+          <p:txBody>
+            <a:bodyPr wrap="square" lIns="91440" tIns="45720" rIns="91440" bIns="45720">
+              <a:spAutoFit/>
+            </a:bodyPr>
+            <a:lstStyle/>
+            <a:p>
+              <a:pPr algn="ctr"/>
+              <a:r>
+                <a:rPr lang="en-US" sz="1400" b="1" spc="50" dirty="0">
+                  <a:ln w="9525" cmpd="sng">
+                    <a:solidFill>
+                      <a:schemeClr val="accent1"/>
+                    </a:solidFill>
+                    <a:prstDash val="solid"/>
+                  </a:ln>
+                  <a:solidFill>
+                    <a:srgbClr val="70AD47">
+                      <a:tint val="1000"/>
+                    </a:srgbClr>
+                  </a:solidFill>
+                  <a:effectLst>
+                    <a:glow rad="38100">
+                      <a:schemeClr val="accent1">
+                        <a:alpha val="40000"/>
+                      </a:schemeClr>
+                    </a:glow>
+                  </a:effectLst>
+                  <a:latin typeface="Abadi" panose="020B0604020104020204" pitchFamily="34" charset="0"/>
+                </a:rPr>
+                <a:t>R</a:t>
+              </a:r>
+            </a:p>
+          </p:txBody>
+        </p:sp>
+      </p:grpSp>
+      <p:sp>
+        <p:nvSpPr>
+          <p:cNvPr id="50" name="Rectangle 49">
+            <a:extLst>
+              <a:ext uri="{FF2B5EF4-FFF2-40B4-BE49-F238E27FC236}">
+                <a16:creationId xmlns:a16="http://schemas.microsoft.com/office/drawing/2014/main" id="{0F475892-5B32-4323-B9A3-CF77BCAAE2F3}"/>
+              </a:ext>
+            </a:extLst>
+          </p:cNvPr>
+          <p:cNvSpPr/>
+          <p:nvPr/>
+        </p:nvSpPr>
+        <p:spPr>
+          <a:xfrm>
+            <a:off x="7666580" y="2544552"/>
+            <a:ext cx="1424539" cy="45719"/>
+          </a:xfrm>
+          <a:prstGeom prst="rect">
+            <a:avLst/>
+          </a:prstGeom>
+          <a:solidFill>
+            <a:srgbClr val="00B050"/>
+          </a:solidFill>
+          <a:ln>
+            <a:solidFill>
+              <a:srgbClr val="00B050"/>
+            </a:solidFill>
+          </a:ln>
+        </p:spPr>
+        <p:style>
+          <a:lnRef idx="2">
+            <a:schemeClr val="accent1">
+              <a:shade val="50000"/>
+            </a:schemeClr>
+          </a:lnRef>
+          <a:fillRef idx="1">
+            <a:schemeClr val="accent1"/>
+          </a:fillRef>
+          <a:effectRef idx="0">
+            <a:schemeClr val="accent1"/>
+          </a:effectRef>
+          <a:fontRef idx="minor">
+            <a:schemeClr val="lt1"/>
+          </a:fontRef>
+        </p:style>
+        <p:txBody>
+          <a:bodyPr rtlCol="0" anchor="ctr"/>
+          <a:lstStyle/>
+          <a:p>
+            <a:pPr algn="ctr"/>
+            <a:endParaRPr lang="en-US"/>
+          </a:p>
+        </p:txBody>
+      </p:sp>
+      <p:grpSp>
+        <p:nvGrpSpPr>
+          <p:cNvPr id="28" name="Group 27">
+            <a:extLst>
+              <a:ext uri="{FF2B5EF4-FFF2-40B4-BE49-F238E27FC236}">
+                <a16:creationId xmlns:a16="http://schemas.microsoft.com/office/drawing/2014/main" id="{7F66090B-7516-40D5-AEF4-D384FDEF0FBB}"/>
+              </a:ext>
+            </a:extLst>
+          </p:cNvPr>
+          <p:cNvGrpSpPr/>
+          <p:nvPr/>
+        </p:nvGrpSpPr>
+        <p:grpSpPr>
+          <a:xfrm>
+            <a:off x="5491305" y="3259588"/>
+            <a:ext cx="1430396" cy="55916"/>
+            <a:chOff x="4959034" y="3396068"/>
+            <a:chExt cx="1430396" cy="55916"/>
+          </a:xfrm>
+        </p:grpSpPr>
+        <p:sp>
+          <p:nvSpPr>
+            <p:cNvPr id="51" name="Rectangle 50">
+              <a:extLst>
+                <a:ext uri="{FF2B5EF4-FFF2-40B4-BE49-F238E27FC236}">
+                  <a16:creationId xmlns:a16="http://schemas.microsoft.com/office/drawing/2014/main" id="{DDCDCA03-117A-498F-B0C6-D452A3996FCA}"/>
+                </a:ext>
+              </a:extLst>
+            </p:cNvPr>
+            <p:cNvSpPr/>
+            <p:nvPr/>
+          </p:nvSpPr>
+          <p:spPr>
+            <a:xfrm>
+              <a:off x="4964891" y="3396068"/>
+              <a:ext cx="1424539" cy="45719"/>
+            </a:xfrm>
+            <a:prstGeom prst="rect">
+              <a:avLst/>
+            </a:prstGeom>
+            <a:solidFill>
+              <a:schemeClr val="accent3">
+                <a:lumMod val="40000"/>
+                <a:lumOff val="60000"/>
+              </a:schemeClr>
             </a:solidFill>
             <a:ln>
               <a:solidFill>
-                <a:schemeClr val="tx1"/>
+                <a:schemeClr val="accent3">
+                  <a:lumMod val="40000"/>
+                  <a:lumOff val="60000"/>
+                </a:schemeClr>
               </a:solidFill>
             </a:ln>
           </p:spPr>
@@ -8720,20 +8423,16 @@
             <a:lstStyle/>
             <a:p>
               <a:pPr algn="ctr"/>
-              <a:endParaRPr lang="en-US" dirty="0">
-                <a:solidFill>
-                  <a:schemeClr val="tx1"/>
-                </a:solidFill>
-              </a:endParaRPr>
+              <a:endParaRPr lang="en-US"/>
             </a:p>
           </p:txBody>
         </p:sp>
         <p:sp>
           <p:nvSpPr>
-            <p:cNvPr id="49" name="Rectangle 48">
+            <p:cNvPr id="52" name="Rectangle 51">
               <a:extLst>
                 <a:ext uri="{FF2B5EF4-FFF2-40B4-BE49-F238E27FC236}">
-                  <a16:creationId xmlns:a16="http://schemas.microsoft.com/office/drawing/2014/main" id="{D9AF24CF-96A4-40D5-94DF-639E88BC2029}"/>
+                  <a16:creationId xmlns:a16="http://schemas.microsoft.com/office/drawing/2014/main" id="{0EA2E7A9-0A86-4597-8317-0982BF05D9FA}"/>
                 </a:ext>
               </a:extLst>
             </p:cNvPr>
@@ -8741,19 +8440,19 @@
             <p:nvPr/>
           </p:nvSpPr>
           <p:spPr>
-            <a:xfrm rot="16200000">
-              <a:off x="6323324" y="5235150"/>
-              <a:ext cx="685800" cy="45719"/>
+            <a:xfrm rot="20531717">
+              <a:off x="4959034" y="3406265"/>
+              <a:ext cx="1424539" cy="45719"/>
             </a:xfrm>
             <a:prstGeom prst="rect">
               <a:avLst/>
             </a:prstGeom>
             <a:solidFill>
-              <a:srgbClr val="00B0F0"/>
+              <a:srgbClr val="00B050"/>
             </a:solidFill>
             <a:ln>
               <a:solidFill>
-                <a:srgbClr val="00B0F0"/>
+                <a:srgbClr val="00B050"/>
               </a:solidFill>
             </a:ln>
           </p:spPr>
@@ -8783,6 +8482,580 @@
           </p:txBody>
         </p:sp>
       </p:grpSp>
+      <p:sp>
+        <p:nvSpPr>
+          <p:cNvPr id="53" name="Rectangle 52">
+            <a:extLst>
+              <a:ext uri="{FF2B5EF4-FFF2-40B4-BE49-F238E27FC236}">
+                <a16:creationId xmlns:a16="http://schemas.microsoft.com/office/drawing/2014/main" id="{6C2BEF40-111E-4557-9877-FAEA0208A6C0}"/>
+              </a:ext>
+            </a:extLst>
+          </p:cNvPr>
+          <p:cNvSpPr/>
+          <p:nvPr/>
+        </p:nvSpPr>
+        <p:spPr>
+          <a:xfrm>
+            <a:off x="7818980" y="2696952"/>
+            <a:ext cx="1424539" cy="45719"/>
+          </a:xfrm>
+          <a:prstGeom prst="rect">
+            <a:avLst/>
+          </a:prstGeom>
+          <a:solidFill>
+            <a:srgbClr val="00B050"/>
+          </a:solidFill>
+          <a:ln>
+            <a:solidFill>
+              <a:srgbClr val="00B050"/>
+            </a:solidFill>
+          </a:ln>
+        </p:spPr>
+        <p:style>
+          <a:lnRef idx="2">
+            <a:schemeClr val="accent1">
+              <a:shade val="50000"/>
+            </a:schemeClr>
+          </a:lnRef>
+          <a:fillRef idx="1">
+            <a:schemeClr val="accent1"/>
+          </a:fillRef>
+          <a:effectRef idx="0">
+            <a:schemeClr val="accent1"/>
+          </a:effectRef>
+          <a:fontRef idx="minor">
+            <a:schemeClr val="lt1"/>
+          </a:fontRef>
+        </p:style>
+        <p:txBody>
+          <a:bodyPr rtlCol="0" anchor="ctr"/>
+          <a:lstStyle/>
+          <a:p>
+            <a:pPr algn="ctr"/>
+            <a:endParaRPr lang="en-US"/>
+          </a:p>
+        </p:txBody>
+      </p:sp>
+      <p:grpSp>
+        <p:nvGrpSpPr>
+          <p:cNvPr id="31" name="Group 30">
+            <a:extLst>
+              <a:ext uri="{FF2B5EF4-FFF2-40B4-BE49-F238E27FC236}">
+                <a16:creationId xmlns:a16="http://schemas.microsoft.com/office/drawing/2014/main" id="{C18B8526-A775-4007-8E7D-A2CF8F2F849C}"/>
+              </a:ext>
+            </a:extLst>
+          </p:cNvPr>
+          <p:cNvGrpSpPr/>
+          <p:nvPr/>
+        </p:nvGrpSpPr>
+        <p:grpSpPr>
+          <a:xfrm>
+            <a:off x="7665177" y="4089991"/>
+            <a:ext cx="1526274" cy="668875"/>
+            <a:chOff x="3416490" y="2183642"/>
+            <a:chExt cx="1526274" cy="668875"/>
+          </a:xfrm>
+        </p:grpSpPr>
+        <p:sp>
+          <p:nvSpPr>
+            <p:cNvPr id="32" name="Rectangle: Rounded Corners 31">
+              <a:extLst>
+                <a:ext uri="{FF2B5EF4-FFF2-40B4-BE49-F238E27FC236}">
+                  <a16:creationId xmlns:a16="http://schemas.microsoft.com/office/drawing/2014/main" id="{E2254923-E1FE-461B-A16C-BEA89BFC742F}"/>
+                </a:ext>
+              </a:extLst>
+            </p:cNvPr>
+            <p:cNvSpPr/>
+            <p:nvPr/>
+          </p:nvSpPr>
+          <p:spPr>
+            <a:xfrm>
+              <a:off x="3957851" y="2183642"/>
+              <a:ext cx="443552" cy="300251"/>
+            </a:xfrm>
+            <a:prstGeom prst="roundRect">
+              <a:avLst/>
+            </a:prstGeom>
+          </p:spPr>
+          <p:style>
+            <a:lnRef idx="2">
+              <a:schemeClr val="accent1">
+                <a:shade val="50000"/>
+              </a:schemeClr>
+            </a:lnRef>
+            <a:fillRef idx="1">
+              <a:schemeClr val="accent1"/>
+            </a:fillRef>
+            <a:effectRef idx="0">
+              <a:schemeClr val="accent1"/>
+            </a:effectRef>
+            <a:fontRef idx="minor">
+              <a:schemeClr val="lt1"/>
+            </a:fontRef>
+          </p:style>
+          <p:txBody>
+            <a:bodyPr rtlCol="0" anchor="ctr"/>
+            <a:lstStyle/>
+            <a:p>
+              <a:pPr algn="ctr"/>
+              <a:endParaRPr lang="en-US"/>
+            </a:p>
+          </p:txBody>
+        </p:sp>
+        <p:sp>
+          <p:nvSpPr>
+            <p:cNvPr id="33" name="Rectangle: Rounded Corners 32">
+              <a:extLst>
+                <a:ext uri="{FF2B5EF4-FFF2-40B4-BE49-F238E27FC236}">
+                  <a16:creationId xmlns:a16="http://schemas.microsoft.com/office/drawing/2014/main" id="{D2AD770E-66C4-4270-81FC-4099AA5B0297}"/>
+                </a:ext>
+              </a:extLst>
+            </p:cNvPr>
+            <p:cNvSpPr/>
+            <p:nvPr/>
+          </p:nvSpPr>
+          <p:spPr>
+            <a:xfrm>
+              <a:off x="3957851" y="2552266"/>
+              <a:ext cx="443552" cy="300251"/>
+            </a:xfrm>
+            <a:prstGeom prst="roundRect">
+              <a:avLst/>
+            </a:prstGeom>
+          </p:spPr>
+          <p:style>
+            <a:lnRef idx="2">
+              <a:schemeClr val="accent1">
+                <a:shade val="50000"/>
+              </a:schemeClr>
+            </a:lnRef>
+            <a:fillRef idx="1">
+              <a:schemeClr val="accent1"/>
+            </a:fillRef>
+            <a:effectRef idx="0">
+              <a:schemeClr val="accent1"/>
+            </a:effectRef>
+            <a:fontRef idx="minor">
+              <a:schemeClr val="lt1"/>
+            </a:fontRef>
+          </p:style>
+          <p:txBody>
+            <a:bodyPr rtlCol="0" anchor="ctr"/>
+            <a:lstStyle/>
+            <a:p>
+              <a:pPr algn="ctr"/>
+              <a:endParaRPr lang="en-US"/>
+            </a:p>
+          </p:txBody>
+        </p:sp>
+        <p:sp>
+          <p:nvSpPr>
+            <p:cNvPr id="34" name="Rectangle: Rounded Corners 33">
+              <a:extLst>
+                <a:ext uri="{FF2B5EF4-FFF2-40B4-BE49-F238E27FC236}">
+                  <a16:creationId xmlns:a16="http://schemas.microsoft.com/office/drawing/2014/main" id="{293D80B2-074C-435C-B5E0-0D64AF3E225D}"/>
+                </a:ext>
+              </a:extLst>
+            </p:cNvPr>
+            <p:cNvSpPr/>
+            <p:nvPr/>
+          </p:nvSpPr>
+          <p:spPr>
+            <a:xfrm>
+              <a:off x="3416490" y="2552266"/>
+              <a:ext cx="443552" cy="300251"/>
+            </a:xfrm>
+            <a:prstGeom prst="roundRect">
+              <a:avLst/>
+            </a:prstGeom>
+            <a:solidFill>
+              <a:schemeClr val="tx2">
+                <a:lumMod val="40000"/>
+                <a:lumOff val="60000"/>
+              </a:schemeClr>
+            </a:solidFill>
+            <a:ln>
+              <a:headEnd type="none" w="med" len="med"/>
+              <a:tailEnd type="none" w="med" len="med"/>
+            </a:ln>
+          </p:spPr>
+          <p:style>
+            <a:lnRef idx="2">
+              <a:schemeClr val="accent1"/>
+            </a:lnRef>
+            <a:fillRef idx="1">
+              <a:schemeClr val="lt1"/>
+            </a:fillRef>
+            <a:effectRef idx="0">
+              <a:schemeClr val="accent1"/>
+            </a:effectRef>
+            <a:fontRef idx="minor">
+              <a:schemeClr val="dk1"/>
+            </a:fontRef>
+          </p:style>
+          <p:txBody>
+            <a:bodyPr rtlCol="0" anchor="ctr"/>
+            <a:lstStyle/>
+            <a:p>
+              <a:pPr algn="ctr"/>
+              <a:endParaRPr lang="en-US"/>
+            </a:p>
+          </p:txBody>
+        </p:sp>
+        <p:sp>
+          <p:nvSpPr>
+            <p:cNvPr id="35" name="Rectangle: Rounded Corners 34">
+              <a:extLst>
+                <a:ext uri="{FF2B5EF4-FFF2-40B4-BE49-F238E27FC236}">
+                  <a16:creationId xmlns:a16="http://schemas.microsoft.com/office/drawing/2014/main" id="{2B95F331-1A52-44C9-83CE-19BC866BE78E}"/>
+                </a:ext>
+              </a:extLst>
+            </p:cNvPr>
+            <p:cNvSpPr/>
+            <p:nvPr/>
+          </p:nvSpPr>
+          <p:spPr>
+            <a:xfrm>
+              <a:off x="4499212" y="2552265"/>
+              <a:ext cx="443552" cy="300251"/>
+            </a:xfrm>
+            <a:prstGeom prst="roundRect">
+              <a:avLst/>
+            </a:prstGeom>
+            <a:solidFill>
+              <a:schemeClr val="tx2">
+                <a:lumMod val="40000"/>
+                <a:lumOff val="60000"/>
+              </a:schemeClr>
+            </a:solidFill>
+            <a:ln>
+              <a:headEnd type="none" w="med" len="med"/>
+              <a:tailEnd type="none" w="med" len="med"/>
+            </a:ln>
+          </p:spPr>
+          <p:style>
+            <a:lnRef idx="2">
+              <a:schemeClr val="accent1"/>
+            </a:lnRef>
+            <a:fillRef idx="1">
+              <a:schemeClr val="lt1"/>
+            </a:fillRef>
+            <a:effectRef idx="0">
+              <a:schemeClr val="accent1"/>
+            </a:effectRef>
+            <a:fontRef idx="minor">
+              <a:schemeClr val="dk1"/>
+            </a:fontRef>
+          </p:style>
+          <p:txBody>
+            <a:bodyPr rtlCol="0" anchor="ctr"/>
+            <a:lstStyle/>
+            <a:p>
+              <a:pPr algn="ctr"/>
+              <a:endParaRPr lang="en-US"/>
+            </a:p>
+          </p:txBody>
+        </p:sp>
+        <p:cxnSp>
+          <p:nvCxnSpPr>
+            <p:cNvPr id="36" name="Straight Arrow Connector 35">
+              <a:extLst>
+                <a:ext uri="{FF2B5EF4-FFF2-40B4-BE49-F238E27FC236}">
+                  <a16:creationId xmlns:a16="http://schemas.microsoft.com/office/drawing/2014/main" id="{0D67CBE7-D963-49C6-80B7-05AFB5EDA46E}"/>
+                </a:ext>
+              </a:extLst>
+            </p:cNvPr>
+            <p:cNvCxnSpPr>
+              <a:cxnSpLocks/>
+            </p:cNvCxnSpPr>
+            <p:nvPr/>
+          </p:nvCxnSpPr>
+          <p:spPr>
+            <a:xfrm flipV="1">
+              <a:off x="4179627" y="2251879"/>
+              <a:ext cx="0" cy="150126"/>
+            </a:xfrm>
+            <a:prstGeom prst="straightConnector1">
+              <a:avLst/>
+            </a:prstGeom>
+            <a:ln>
+              <a:solidFill>
+                <a:schemeClr val="bg1"/>
+              </a:solidFill>
+              <a:tailEnd type="triangle"/>
+            </a:ln>
+          </p:spPr>
+          <p:style>
+            <a:lnRef idx="1">
+              <a:schemeClr val="accent1"/>
+            </a:lnRef>
+            <a:fillRef idx="0">
+              <a:schemeClr val="accent1"/>
+            </a:fillRef>
+            <a:effectRef idx="0">
+              <a:schemeClr val="accent1"/>
+            </a:effectRef>
+            <a:fontRef idx="minor">
+              <a:schemeClr val="tx1"/>
+            </a:fontRef>
+          </p:style>
+        </p:cxnSp>
+        <p:cxnSp>
+          <p:nvCxnSpPr>
+            <p:cNvPr id="37" name="Straight Arrow Connector 36">
+              <a:extLst>
+                <a:ext uri="{FF2B5EF4-FFF2-40B4-BE49-F238E27FC236}">
+                  <a16:creationId xmlns:a16="http://schemas.microsoft.com/office/drawing/2014/main" id="{DD038403-C083-4DAC-A0C2-506CBC931457}"/>
+                </a:ext>
+              </a:extLst>
+            </p:cNvPr>
+            <p:cNvCxnSpPr>
+              <a:cxnSpLocks/>
+            </p:cNvCxnSpPr>
+            <p:nvPr/>
+          </p:nvCxnSpPr>
+          <p:spPr>
+            <a:xfrm>
+              <a:off x="4179627" y="2631133"/>
+              <a:ext cx="0" cy="163954"/>
+            </a:xfrm>
+            <a:prstGeom prst="straightConnector1">
+              <a:avLst/>
+            </a:prstGeom>
+            <a:ln>
+              <a:solidFill>
+                <a:schemeClr val="bg1"/>
+              </a:solidFill>
+              <a:tailEnd type="triangle"/>
+            </a:ln>
+          </p:spPr>
+          <p:style>
+            <a:lnRef idx="1">
+              <a:schemeClr val="accent1"/>
+            </a:lnRef>
+            <a:fillRef idx="0">
+              <a:schemeClr val="accent1"/>
+            </a:fillRef>
+            <a:effectRef idx="0">
+              <a:schemeClr val="accent1"/>
+            </a:effectRef>
+            <a:fontRef idx="minor">
+              <a:schemeClr val="tx1"/>
+            </a:fontRef>
+          </p:style>
+        </p:cxnSp>
+        <p:cxnSp>
+          <p:nvCxnSpPr>
+            <p:cNvPr id="38" name="Straight Arrow Connector 37">
+              <a:extLst>
+                <a:ext uri="{FF2B5EF4-FFF2-40B4-BE49-F238E27FC236}">
+                  <a16:creationId xmlns:a16="http://schemas.microsoft.com/office/drawing/2014/main" id="{7B3E2155-D59B-4340-B90C-DBF71076B294}"/>
+                </a:ext>
+              </a:extLst>
+            </p:cNvPr>
+            <p:cNvCxnSpPr>
+              <a:cxnSpLocks/>
+            </p:cNvCxnSpPr>
+            <p:nvPr/>
+          </p:nvCxnSpPr>
+          <p:spPr>
+            <a:xfrm>
+              <a:off x="4635707" y="2702390"/>
+              <a:ext cx="174659" cy="0"/>
+            </a:xfrm>
+            <a:prstGeom prst="straightConnector1">
+              <a:avLst/>
+            </a:prstGeom>
+            <a:ln>
+              <a:solidFill>
+                <a:schemeClr val="bg1"/>
+              </a:solidFill>
+              <a:tailEnd type="triangle"/>
+            </a:ln>
+          </p:spPr>
+          <p:style>
+            <a:lnRef idx="1">
+              <a:schemeClr val="accent1"/>
+            </a:lnRef>
+            <a:fillRef idx="0">
+              <a:schemeClr val="accent1"/>
+            </a:fillRef>
+            <a:effectRef idx="0">
+              <a:schemeClr val="accent1"/>
+            </a:effectRef>
+            <a:fontRef idx="minor">
+              <a:schemeClr val="tx1"/>
+            </a:fontRef>
+          </p:style>
+        </p:cxnSp>
+        <p:cxnSp>
+          <p:nvCxnSpPr>
+            <p:cNvPr id="39" name="Straight Arrow Connector 38">
+              <a:extLst>
+                <a:ext uri="{FF2B5EF4-FFF2-40B4-BE49-F238E27FC236}">
+                  <a16:creationId xmlns:a16="http://schemas.microsoft.com/office/drawing/2014/main" id="{8886EC48-ED77-4E83-BAE7-B795F7AC6B2E}"/>
+                </a:ext>
+              </a:extLst>
+            </p:cNvPr>
+            <p:cNvCxnSpPr>
+              <a:cxnSpLocks/>
+            </p:cNvCxnSpPr>
+            <p:nvPr/>
+          </p:nvCxnSpPr>
+          <p:spPr>
+            <a:xfrm flipH="1">
+              <a:off x="3551997" y="2702390"/>
+              <a:ext cx="172538" cy="0"/>
+            </a:xfrm>
+            <a:prstGeom prst="straightConnector1">
+              <a:avLst/>
+            </a:prstGeom>
+            <a:ln>
+              <a:solidFill>
+                <a:schemeClr val="bg1"/>
+              </a:solidFill>
+              <a:tailEnd type="triangle"/>
+            </a:ln>
+          </p:spPr>
+          <p:style>
+            <a:lnRef idx="1">
+              <a:schemeClr val="accent1"/>
+            </a:lnRef>
+            <a:fillRef idx="0">
+              <a:schemeClr val="accent1"/>
+            </a:fillRef>
+            <a:effectRef idx="0">
+              <a:schemeClr val="accent1"/>
+            </a:effectRef>
+            <a:fontRef idx="minor">
+              <a:schemeClr val="tx1"/>
+            </a:fontRef>
+          </p:style>
+        </p:cxnSp>
+      </p:grpSp>
+      <p:grpSp>
+        <p:nvGrpSpPr>
+          <p:cNvPr id="40" name="Group 39">
+            <a:extLst>
+              <a:ext uri="{FF2B5EF4-FFF2-40B4-BE49-F238E27FC236}">
+                <a16:creationId xmlns:a16="http://schemas.microsoft.com/office/drawing/2014/main" id="{CAFF009B-FE8C-4B86-BEBF-DD0C1033FECD}"/>
+              </a:ext>
+            </a:extLst>
+          </p:cNvPr>
+          <p:cNvGrpSpPr/>
+          <p:nvPr/>
+        </p:nvGrpSpPr>
+        <p:grpSpPr>
+          <a:xfrm>
+            <a:off x="6984648" y="4305279"/>
+            <a:ext cx="443552" cy="312769"/>
+            <a:chOff x="1312460" y="4287672"/>
+            <a:chExt cx="443552" cy="312769"/>
+          </a:xfrm>
+        </p:grpSpPr>
+        <p:sp>
+          <p:nvSpPr>
+            <p:cNvPr id="41" name="Rectangle: Rounded Corners 40">
+              <a:extLst>
+                <a:ext uri="{FF2B5EF4-FFF2-40B4-BE49-F238E27FC236}">
+                  <a16:creationId xmlns:a16="http://schemas.microsoft.com/office/drawing/2014/main" id="{205C974A-C7DF-4873-ADD4-73E7D6527B74}"/>
+                </a:ext>
+              </a:extLst>
+            </p:cNvPr>
+            <p:cNvSpPr/>
+            <p:nvPr/>
+          </p:nvSpPr>
+          <p:spPr>
+            <a:xfrm>
+              <a:off x="1312460" y="4287672"/>
+              <a:ext cx="443552" cy="300251"/>
+            </a:xfrm>
+            <a:prstGeom prst="roundRect">
+              <a:avLst/>
+            </a:prstGeom>
+          </p:spPr>
+          <p:style>
+            <a:lnRef idx="2">
+              <a:schemeClr val="accent1">
+                <a:shade val="50000"/>
+              </a:schemeClr>
+            </a:lnRef>
+            <a:fillRef idx="1">
+              <a:schemeClr val="accent1"/>
+            </a:fillRef>
+            <a:effectRef idx="0">
+              <a:schemeClr val="accent1"/>
+            </a:effectRef>
+            <a:fontRef idx="minor">
+              <a:schemeClr val="lt1"/>
+            </a:fontRef>
+          </p:style>
+          <p:txBody>
+            <a:bodyPr rtlCol="0" anchor="ctr"/>
+            <a:lstStyle/>
+            <a:p>
+              <a:pPr algn="ctr"/>
+              <a:endParaRPr lang="en-US"/>
+            </a:p>
+          </p:txBody>
+        </p:sp>
+        <p:sp>
+          <p:nvSpPr>
+            <p:cNvPr id="42" name="Rectangle 41">
+              <a:extLst>
+                <a:ext uri="{FF2B5EF4-FFF2-40B4-BE49-F238E27FC236}">
+                  <a16:creationId xmlns:a16="http://schemas.microsoft.com/office/drawing/2014/main" id="{C8B788E2-5163-4C99-A0CA-6350FEC9A565}"/>
+                </a:ext>
+              </a:extLst>
+            </p:cNvPr>
+            <p:cNvSpPr/>
+            <p:nvPr/>
+          </p:nvSpPr>
+          <p:spPr>
+            <a:xfrm>
+              <a:off x="1387398" y="4292664"/>
+              <a:ext cx="284052" cy="307777"/>
+            </a:xfrm>
+            <a:prstGeom prst="rect">
+              <a:avLst/>
+            </a:prstGeom>
+            <a:noFill/>
+          </p:spPr>
+          <p:txBody>
+            <a:bodyPr wrap="none" lIns="91440" tIns="45720" rIns="91440" bIns="45720">
+              <a:spAutoFit/>
+            </a:bodyPr>
+            <a:lstStyle/>
+            <a:p>
+              <a:pPr algn="ctr"/>
+              <a:r>
+                <a:rPr lang="en-US" sz="1400" b="1" cap="none" spc="50" dirty="0">
+                  <a:ln w="9525" cmpd="sng">
+                    <a:solidFill>
+                      <a:schemeClr val="accent1"/>
+                    </a:solidFill>
+                    <a:prstDash val="solid"/>
+                  </a:ln>
+                  <a:solidFill>
+                    <a:srgbClr val="70AD47">
+                      <a:tint val="1000"/>
+                    </a:srgbClr>
+                  </a:solidFill>
+                  <a:effectLst>
+                    <a:glow rad="38100">
+                      <a:schemeClr val="accent1">
+                        <a:alpha val="40000"/>
+                      </a:schemeClr>
+                    </a:glow>
+                  </a:effectLst>
+                  <a:latin typeface="Abadi" panose="020B0604020104020204" pitchFamily="34" charset="0"/>
+                </a:rPr>
+                <a:t>S</a:t>
+              </a:r>
+            </a:p>
+          </p:txBody>
+        </p:sp>
+      </p:grpSp>
     </p:spTree>
     <p:extLst>
       <p:ext uri="{BB962C8B-B14F-4D97-AF65-F5344CB8AC3E}">
@@ -8793,11 +9066,11 @@
   <p:clrMapOvr>
     <a:masterClrMapping/>
   </p:clrMapOvr>
-  <mc:AlternateContent xmlns:mc="http://schemas.openxmlformats.org/markup-compatibility/2006">
-    <mc:Choice xmlns:p14="http://schemas.microsoft.com/office/powerpoint/2010/main" Requires="p14">
+  <mc:AlternateContent xmlns:mc="http://schemas.openxmlformats.org/markup-compatibility/2006" xmlns:p14="http://schemas.microsoft.com/office/powerpoint/2010/main">
+    <mc:Choice Requires="p14">
       <p:transition spd="slow" p14:dur="3000" advClick="0" advTm="15000"/>
     </mc:Choice>
-    <mc:Fallback>
+    <mc:Fallback xmlns="">
       <p:transition spd="slow" advClick="0" advTm="15000"/>
     </mc:Fallback>
   </mc:AlternateContent>

</xml_diff>